<commit_message>
[2023-02-01]RMS시스템 v2.0(2023-02-07,update 및 기존 DB 수정 완료)
</commit_message>
<xml_diff>
--- a/src/main/webapp/WEB-INF/Files/web_sample.pptx
+++ b/src/main/webapp/WEB-INF/Files/web_sample.pptx
@@ -85,7 +85,7 @@
       </p:grpSpPr>
       <p:sp>
         <p:nvSpPr>
-          <p:cNvPr id="2042476677" name="Text">
+          <p:cNvPr id="1927148557" name="Text">
     </p:cNvPr>
           <p:cNvSpPr>
             <a:spLocks noGrp="1"/>
@@ -134,7 +134,7 @@
       </p:sp>
       <p:sp>
         <p:nvSpPr>
-          <p:cNvPr id="1528821580" name="Text">
+          <p:cNvPr id="626898106" name="Text">
     </p:cNvPr>
           <p:cNvSpPr>
             <a:spLocks noGrp="1"/>
@@ -183,7 +183,7 @@
       </p:sp>
       <p:sp>
         <p:nvSpPr>
-          <p:cNvPr id="620589984" name="Line"/>
+          <p:cNvPr id="1846764725" name="Line"/>
           <p:cNvSpPr>
             <a:spLocks noGrp="1"/>
           </p:cNvSpPr>
@@ -217,7 +217,7 @@
       </p:sp>
       <p:sp>
         <p:nvSpPr>
-          <p:cNvPr id="1101970363" name="Text">
+          <p:cNvPr id="1690487590" name="Text">
     </p:cNvPr>
           <p:cNvSpPr>
             <a:spLocks noGrp="1"/>
@@ -263,7 +263,7 @@
       </p:sp>
       <p:sp>
         <p:nvSpPr>
-          <p:cNvPr id="1438866075" name="Text">
+          <p:cNvPr id="2040669743" name="Text">
     </p:cNvPr>
           <p:cNvSpPr>
             <a:spLocks noGrp="1"/>
@@ -327,7 +327,7 @@
       </p:sp>
       <p:sp>
         <p:nvSpPr>
-          <p:cNvPr id="1900176120" name="Text">
+          <p:cNvPr id="823309765" name="Text">
     </p:cNvPr>
           <p:cNvSpPr>
             <a:spLocks noGrp="1"/>
@@ -382,7 +382,7 @@
       </p:sp>
       <p:sp>
         <p:nvSpPr>
-          <p:cNvPr id="1047363331" name="Text">
+          <p:cNvPr id="1154566558" name="Text">
     </p:cNvPr>
           <p:cNvSpPr>
             <a:spLocks noGrp="1"/>
@@ -437,7 +437,7 @@
       </p:sp>
       <p:sp>
         <p:nvSpPr>
-          <p:cNvPr id="170551318" name="Text">
+          <p:cNvPr id="909652441" name="Text">
     </p:cNvPr>
           <p:cNvSpPr>
             <a:spLocks noGrp="1"/>
@@ -501,7 +501,7 @@
       </p:sp>
       <p:sp>
         <p:nvSpPr>
-          <p:cNvPr id="1165163594" name="Text">
+          <p:cNvPr id="1589897839" name="Text">
     </p:cNvPr>
           <p:cNvSpPr>
             <a:spLocks noGrp="1"/>
@@ -565,7 +565,7 @@
       </p:sp>
       <p:sp>
         <p:nvSpPr>
-          <p:cNvPr id="658834366" name="Text">
+          <p:cNvPr id="2061226223" name="Text">
     </p:cNvPr>
           <p:cNvSpPr>
             <a:spLocks noGrp="1"/>
@@ -620,7 +620,7 @@
       </p:sp>
       <p:sp>
         <p:nvSpPr>
-          <p:cNvPr id="1921381682" name="Text">
+          <p:cNvPr id="873003923" name="Text">
     </p:cNvPr>
           <p:cNvSpPr>
             <a:spLocks noGrp="1"/>
@@ -675,7 +675,7 @@
       </p:sp>
       <p:sp>
         <p:nvSpPr>
-          <p:cNvPr id="733366700" name="Text">
+          <p:cNvPr id="1137291826" name="Text">
     </p:cNvPr>
           <p:cNvSpPr>
             <a:spLocks noGrp="1"/>
@@ -739,7 +739,7 @@
       </p:sp>
       <p:sp>
         <p:nvSpPr>
-          <p:cNvPr id="2046062652" name="Text">
+          <p:cNvPr id="43563190" name="Text">
     </p:cNvPr>
           <p:cNvSpPr>
             <a:spLocks noGrp="1"/>
@@ -803,7 +803,7 @@
       </p:sp>
       <p:sp>
         <p:nvSpPr>
-          <p:cNvPr id="1990444111" name="Text">
+          <p:cNvPr id="643849378" name="Text">
     </p:cNvPr>
           <p:cNvSpPr>
             <a:spLocks noGrp="1"/>
@@ -866,7 +866,7 @@
       </p:sp>
       <p:sp>
         <p:nvSpPr>
-          <p:cNvPr id="735220684" name="Text">
+          <p:cNvPr id="1439166366" name="Text">
     </p:cNvPr>
           <p:cNvSpPr>
             <a:spLocks noGrp="1"/>
@@ -929,7 +929,7 @@
       </p:sp>
       <p:sp>
         <p:nvSpPr>
-          <p:cNvPr id="850416691" name="Text">
+          <p:cNvPr id="1536270134" name="Text">
     </p:cNvPr>
           <p:cNvSpPr>
             <a:spLocks noGrp="1"/>
@@ -1000,7 +1000,7 @@
       </p:sp>
       <p:sp>
         <p:nvSpPr>
-          <p:cNvPr id="1755297737" name="Text">
+          <p:cNvPr id="478921210" name="Text">
     </p:cNvPr>
           <p:cNvSpPr>
             <a:spLocks noGrp="1"/>
@@ -1071,7 +1071,7 @@
       </p:sp>
       <p:sp>
         <p:nvSpPr>
-          <p:cNvPr id="16156457" name="Text">
+          <p:cNvPr id="942279557" name="Text">
     </p:cNvPr>
           <p:cNvSpPr>
             <a:spLocks noGrp="1"/>
@@ -1142,7 +1142,7 @@
       </p:sp>
       <p:sp>
         <p:nvSpPr>
-          <p:cNvPr id="1065691144" name="Text">
+          <p:cNvPr id="1392224257" name="Text">
     </p:cNvPr>
           <p:cNvSpPr>
             <a:spLocks noGrp="1"/>
@@ -1206,23 +1206,23 @@
                 <a:ea typeface="맑은 고딕"/>
                 <a:cs typeface="맑은 고딕"/>
               </a:rPr>
-              <a:t>- [e-Pro] 일반용역 계약(PO#4501149897)</a:t>
-            </a:r>
-            <a:br/>
-            <a:r>
-              <a:rPr lang="ko" sz="900">
-                <a:latin typeface="맑은 고딕"/>
-                <a:ea typeface="맑은 고딕"/>
-                <a:cs typeface="맑은 고딕"/>
-              </a:rPr>
-              <a:t>    건에 대한 변경 요청</a:t>
-            </a:r>
-          </a:p>
-        </p:txBody>
-      </p:sp>
-      <p:sp>
-        <p:nvSpPr>
-          <p:cNvPr id="254075399" name="Text">
+              <a:t>- [e-Pro] 일반용역 계약(PO#4501149897)건에 대한 </a:t>
+            </a:r>
+            <a:br/>
+            <a:r>
+              <a:rPr lang="ko" sz="900">
+                <a:latin typeface="맑은 고딕"/>
+                <a:ea typeface="맑은 고딕"/>
+                <a:cs typeface="맑은 고딕"/>
+              </a:rPr>
+              <a:t>변경 요청</a:t>
+            </a:r>
+          </a:p>
+        </p:txBody>
+      </p:sp>
+      <p:sp>
+        <p:nvSpPr>
+          <p:cNvPr id="88401223" name="Text">
     </p:cNvPr>
           <p:cNvSpPr>
             <a:spLocks noGrp="1"/>
@@ -1294,7 +1294,7 @@
       </p:sp>
       <p:sp>
         <p:nvSpPr>
-          <p:cNvPr id="445660629" name="Text">
+          <p:cNvPr id="1199726596" name="Text">
     </p:cNvPr>
           <p:cNvSpPr>
             <a:spLocks noGrp="1"/>
@@ -1366,7 +1366,7 @@
       </p:sp>
       <p:sp>
         <p:nvSpPr>
-          <p:cNvPr id="778776161" name="Text">
+          <p:cNvPr id="798764370" name="Text">
     </p:cNvPr>
           <p:cNvSpPr>
             <a:spLocks noGrp="1"/>
@@ -1438,7 +1438,7 @@
       </p:sp>
       <p:sp>
         <p:nvSpPr>
-          <p:cNvPr id="943232716" name="Text">
+          <p:cNvPr id="547889920" name="Text">
     </p:cNvPr>
           <p:cNvSpPr>
             <a:spLocks noGrp="1"/>
@@ -1448,7 +1448,7 @@
         <p:spPr>
           <a:xfrm rot="0">
             <a:off x="9867900" y="3251200"/>
-            <a:ext cx="635000" cy="1524000"/>
+            <a:ext cx="635000" cy="2882900"/>
           </a:xfrm>
           <a:prstGeom prst="rect">
             <a:avLst/>
@@ -1487,17 +1487,638 @@
               <a:t>01/27</a:t>
             </a:r>
             <a:br/>
-            <a:br/>
-            <a:br/>
-            <a:r>
-              <a:rPr lang="ko" sz="900">
-                <a:latin typeface="맑은 고딕"/>
-                <a:ea typeface="맑은 고딕"/>
-                <a:cs typeface="맑은 고딕"/>
-              </a:rPr>
-              <a:t>[보류]</a:t>
-            </a:r>
-            <a:br/>
+            <a:r>
+              <a:rPr lang="ko" sz="900">
+                <a:latin typeface="맑은 고딕"/>
+                <a:ea typeface="맑은 고딕"/>
+                <a:cs typeface="맑은 고딕"/>
+              </a:rPr>
+              <a:t>02/10</a:t>
+            </a:r>
+            <a:br/>
+            <a:r>
+              <a:rPr lang="ko" sz="900">
+                <a:latin typeface="맑은 고딕"/>
+                <a:ea typeface="맑은 고딕"/>
+                <a:cs typeface="맑은 고딕"/>
+              </a:rPr>
+              <a:t>03/03</a:t>
+            </a:r>
+          </a:p>
+        </p:txBody>
+      </p:sp>
+      <p:sp>
+        <p:nvSpPr>
+          <p:cNvPr id="40146063" name="Text">
+    </p:cNvPr>
+          <p:cNvSpPr>
+            <a:spLocks noGrp="1"/>
+          </p:cNvSpPr>
+          <p:nvPr/>
+        </p:nvSpPr>
+        <p:spPr>
+          <a:xfrm rot="0">
+            <a:off x="9232900" y="3251200"/>
+            <a:ext cx="635000" cy="2882900"/>
+          </a:xfrm>
+          <a:prstGeom prst="rect">
+            <a:avLst/>
+          </a:prstGeom>
+          <a:ln w="12700">
+            <a:solidFill>
+              <a:srgbClr val="000000"/>
+            </a:solidFill>
+            <a:prstDash val="solid"/>
+          </a:ln>
+        </p:spPr>
+        <p:txBody>
+          <a:bodyPr wrap="square" lIns="0" tIns="0" rIns="0" bIns="0" rtlCol="0" anchor="t"/>
+          <a:lstStyle/>
+          <a:p>
+            <a:pPr algn="ctr">
+              <a:lnSpc>
+                <a:spcPct val="100%"/>
+              </a:lnSpc>
+              <a:defRPr sz="900">
+                <a:solidFill>
+                  <a:srgbClr val="000000"/>
+                </a:solidFill>
+                <a:latin typeface="맑은 고딕"/>
+                <a:ea typeface="맑은 고딕"/>
+                <a:cs typeface="맑은 고딕"/>
+              </a:defRPr>
+            </a:pPr>
+            <a:br/>
+            <a:r>
+              <a:rPr lang="ko" sz="900">
+                <a:latin typeface="맑은 고딕"/>
+                <a:ea typeface="맑은 고딕"/>
+                <a:cs typeface="맑은 고딕"/>
+              </a:rPr>
+              <a:t>01/26</a:t>
+            </a:r>
+            <a:br/>
+            <a:r>
+              <a:rPr lang="ko" sz="900">
+                <a:latin typeface="맑은 고딕"/>
+                <a:ea typeface="맑은 고딕"/>
+                <a:cs typeface="맑은 고딕"/>
+              </a:rPr>
+              <a:t>01/26</a:t>
+            </a:r>
+            <a:br/>
+            <a:r>
+              <a:rPr lang="ko" sz="900">
+                <a:latin typeface="맑은 고딕"/>
+                <a:ea typeface="맑은 고딕"/>
+                <a:cs typeface="맑은 고딕"/>
+              </a:rPr>
+              <a:t>01/26</a:t>
+            </a:r>
+          </a:p>
+        </p:txBody>
+      </p:sp>
+      <p:sp>
+        <p:nvSpPr>
+          <p:cNvPr id="1446135431" name="Text">
+    </p:cNvPr>
+          <p:cNvSpPr>
+            <a:spLocks noGrp="1"/>
+          </p:cNvSpPr>
+          <p:nvPr/>
+        </p:nvSpPr>
+        <p:spPr>
+          <a:xfrm rot="0">
+            <a:off x="6388100" y="3251200"/>
+            <a:ext cx="2844800" cy="2882900"/>
+          </a:xfrm>
+          <a:prstGeom prst="rect">
+            <a:avLst/>
+          </a:prstGeom>
+          <a:ln w="12700">
+            <a:solidFill>
+              <a:srgbClr val="000000"/>
+            </a:solidFill>
+            <a:prstDash val="solid"/>
+          </a:ln>
+        </p:spPr>
+        <p:txBody>
+          <a:bodyPr wrap="square" lIns="0" tIns="0" rIns="0" bIns="0" rtlCol="0" anchor="t"/>
+          <a:lstStyle/>
+          <a:p>
+            <a:pPr algn="l">
+              <a:lnSpc>
+                <a:spcPct val="100%"/>
+              </a:lnSpc>
+              <a:defRPr sz="900">
+                <a:solidFill>
+                  <a:srgbClr val="000000"/>
+                </a:solidFill>
+                <a:latin typeface="맑은 고딕"/>
+                <a:ea typeface="맑은 고딕"/>
+                <a:cs typeface="맑은 고딕"/>
+              </a:defRPr>
+            </a:pPr>
+            <a:br/>
+            <a:r>
+              <a:rPr lang="ko" sz="900">
+                <a:latin typeface="맑은 고딕"/>
+                <a:ea typeface="맑은 고딕"/>
+                <a:cs typeface="맑은 고딕"/>
+              </a:rPr>
+              <a:t>- [ASM] JIRA 변경 관리 요청 업무</a:t>
+            </a:r>
+            <a:br/>
+            <a:r>
+              <a:rPr lang="ko" sz="900">
+                <a:latin typeface="맑은 고딕"/>
+                <a:ea typeface="맑은 고딕"/>
+                <a:cs typeface="맑은 고딕"/>
+              </a:rPr>
+              <a:t>- [ASM] 자동 배포 진행(GCMS)</a:t>
+            </a:r>
+            <a:br/>
+            <a:r>
+              <a:rPr lang="ko" sz="900">
+                <a:latin typeface="맑은 고딕"/>
+                <a:ea typeface="맑은 고딕"/>
+                <a:cs typeface="맑은 고딕"/>
+              </a:rPr>
+              <a:t>- [ATSS] 차량별시행현황 지도 개발</a:t>
+            </a:r>
+          </a:p>
+        </p:txBody>
+      </p:sp>
+      <p:sp>
+        <p:nvSpPr>
+          <p:cNvPr id="411699118" name="Text">
+    </p:cNvPr>
+          <p:cNvSpPr>
+            <a:spLocks noGrp="1"/>
+          </p:cNvSpPr>
+          <p:nvPr/>
+        </p:nvSpPr>
+        <p:spPr>
+          <a:xfrm rot="0">
+            <a:off x="5753100" y="3251200"/>
+            <a:ext cx="635000" cy="2882900"/>
+          </a:xfrm>
+          <a:prstGeom prst="rect">
+            <a:avLst/>
+          </a:prstGeom>
+          <a:ln w="12700">
+            <a:solidFill>
+              <a:srgbClr val="000000"/>
+            </a:solidFill>
+            <a:prstDash val="solid"/>
+          </a:ln>
+        </p:spPr>
+        <p:txBody>
+          <a:bodyPr wrap="square" lIns="0" tIns="0" rIns="0" bIns="0" rtlCol="0" anchor="t"/>
+          <a:lstStyle/>
+          <a:p>
+            <a:pPr algn="ctr">
+              <a:lnSpc>
+                <a:spcPct val="100%"/>
+              </a:lnSpc>
+              <a:defRPr sz="900">
+                <a:solidFill>
+                  <a:srgbClr val="000000"/>
+                </a:solidFill>
+                <a:latin typeface="맑은 고딕"/>
+                <a:ea typeface="맑은 고딕"/>
+                <a:cs typeface="맑은 고딕"/>
+              </a:defRPr>
+            </a:pPr>
+            <a:br/>
+            <a:r>
+              <a:rPr lang="ko" sz="900">
+                <a:latin typeface="맑은 고딕"/>
+                <a:ea typeface="맑은 고딕"/>
+                <a:cs typeface="맑은 고딕"/>
+              </a:rPr>
+              <a:t>ATSS</a:t>
+            </a:r>
+            <a:br/>
+            <a:r>
+              <a:rPr lang="ko" sz="900">
+                <a:latin typeface="맑은 고딕"/>
+                <a:ea typeface="맑은 고딕"/>
+                <a:cs typeface="맑은 고딕"/>
+              </a:rPr>
+              <a:t>/ASM</a:t>
+            </a:r>
+            <a:br/>
+            <a:r>
+              <a:rPr lang="ko" sz="900">
+                <a:latin typeface="맑은 고딕"/>
+                <a:ea typeface="맑은 고딕"/>
+                <a:cs typeface="맑은 고딕"/>
+              </a:rPr>
+              <a:t>/Mobile</a:t>
+            </a:r>
+            <a:br/>
+            <a:r>
+              <a:rPr lang="ko" sz="900">
+                <a:latin typeface="맑은 고딕"/>
+                <a:ea typeface="맑은 고딕"/>
+                <a:cs typeface="맑은 고딕"/>
+              </a:rPr>
+              <a:t>/Admin관리</a:t>
+            </a:r>
+            <a:br/>
+            <a:r>
+              <a:rPr lang="ko" sz="900">
+                <a:latin typeface="맑은 고딕"/>
+                <a:ea typeface="맑은 고딕"/>
+                <a:cs typeface="맑은 고딕"/>
+              </a:rPr>
+              <a:t>박민우</a:t>
+            </a:r>
+          </a:p>
+        </p:txBody>
+      </p:sp>
+      <p:sp>
+        <p:nvSpPr>
+          <p:cNvPr id="2036045724" name="Text">
+    </p:cNvPr>
+          <p:cNvSpPr>
+            <a:spLocks noGrp="1"/>
+          </p:cNvSpPr>
+          <p:nvPr/>
+        </p:nvSpPr>
+        <p:spPr>
+          <a:xfrm rot="0">
+            <a:off x="165100" y="3251200"/>
+            <a:ext cx="723900" cy="2882900"/>
+          </a:xfrm>
+          <a:prstGeom prst="rect">
+            <a:avLst/>
+          </a:prstGeom>
+          <a:ln w="12700">
+            <a:solidFill>
+              <a:srgbClr val="000000"/>
+            </a:solidFill>
+            <a:prstDash val="solid"/>
+          </a:ln>
+        </p:spPr>
+        <p:txBody>
+          <a:bodyPr wrap="square" lIns="0" tIns="0" rIns="0" bIns="0" rtlCol="0" anchor="t"/>
+          <a:lstStyle/>
+          <a:p>
+            <a:pPr algn="ctr">
+              <a:lnSpc>
+                <a:spcPct val="100%"/>
+              </a:lnSpc>
+              <a:defRPr sz="900">
+                <a:solidFill>
+                  <a:srgbClr val="000000"/>
+                </a:solidFill>
+                <a:latin typeface="맑은 고딕"/>
+                <a:ea typeface="맑은 고딕"/>
+                <a:cs typeface="맑은 고딕"/>
+              </a:defRPr>
+            </a:pPr>
+            <a:br/>
+            <a:r>
+              <a:rPr lang="ko" sz="900">
+                <a:latin typeface="맑은 고딕"/>
+                <a:ea typeface="맑은 고딕"/>
+                <a:cs typeface="맑은 고딕"/>
+              </a:rPr>
+              <a:t>ATSS</a:t>
+            </a:r>
+            <a:br/>
+            <a:r>
+              <a:rPr lang="ko" sz="900">
+                <a:latin typeface="맑은 고딕"/>
+                <a:ea typeface="맑은 고딕"/>
+                <a:cs typeface="맑은 고딕"/>
+              </a:rPr>
+              <a:t>/ASM</a:t>
+            </a:r>
+            <a:br/>
+            <a:r>
+              <a:rPr lang="ko" sz="900">
+                <a:latin typeface="맑은 고딕"/>
+                <a:ea typeface="맑은 고딕"/>
+                <a:cs typeface="맑은 고딕"/>
+              </a:rPr>
+              <a:t>/Mobile</a:t>
+            </a:r>
+            <a:br/>
+            <a:r>
+              <a:rPr lang="ko" sz="900">
+                <a:latin typeface="맑은 고딕"/>
+                <a:ea typeface="맑은 고딕"/>
+                <a:cs typeface="맑은 고딕"/>
+              </a:rPr>
+              <a:t>/Admin관리</a:t>
+            </a:r>
+            <a:br/>
+            <a:r>
+              <a:rPr lang="ko" sz="900">
+                <a:latin typeface="맑은 고딕"/>
+                <a:ea typeface="맑은 고딕"/>
+                <a:cs typeface="맑은 고딕"/>
+              </a:rPr>
+              <a:t>박민우</a:t>
+            </a:r>
+          </a:p>
+        </p:txBody>
+      </p:sp>
+      <p:sp>
+        <p:nvSpPr>
+          <p:cNvPr id="1597879508" name="Text">
+    </p:cNvPr>
+          <p:cNvSpPr>
+            <a:spLocks noGrp="1"/>
+          </p:cNvSpPr>
+          <p:nvPr/>
+        </p:nvSpPr>
+        <p:spPr>
+          <a:xfrm rot="0">
+            <a:off x="889000" y="3251200"/>
+            <a:ext cx="2882900" cy="2882900"/>
+          </a:xfrm>
+          <a:prstGeom prst="rect">
+            <a:avLst/>
+          </a:prstGeom>
+          <a:ln w="12700">
+            <a:solidFill>
+              <a:srgbClr val="000000"/>
+            </a:solidFill>
+            <a:prstDash val="solid"/>
+          </a:ln>
+        </p:spPr>
+        <p:txBody>
+          <a:bodyPr wrap="square" lIns="0" tIns="0" rIns="0" bIns="0" rtlCol="0" anchor="t"/>
+          <a:lstStyle/>
+          <a:p>
+            <a:pPr algn="l">
+              <a:lnSpc>
+                <a:spcPct val="100%"/>
+              </a:lnSpc>
+              <a:defRPr sz="900">
+                <a:solidFill>
+                  <a:srgbClr val="000000"/>
+                </a:solidFill>
+                <a:latin typeface="맑은 고딕"/>
+                <a:ea typeface="맑은 고딕"/>
+                <a:cs typeface="맑은 고딕"/>
+              </a:defRPr>
+            </a:pPr>
+            <a:br/>
+            <a:r>
+              <a:rPr lang="ko" sz="900">
+                <a:latin typeface="맑은 고딕"/>
+                <a:ea typeface="맑은 고딕"/>
+                <a:cs typeface="맑은 고딕"/>
+              </a:rPr>
+              <a:t>- [ASM] GCMS 자동 배포 개발</a:t>
+            </a:r>
+            <a:br/>
+            <a:r>
+              <a:rPr lang="ko" sz="900">
+                <a:latin typeface="맑은 고딕"/>
+                <a:ea typeface="맑은 고딕"/>
+                <a:cs typeface="맑은 고딕"/>
+              </a:rPr>
+              <a:t>- [ASM] ITSM-48505 변경 요청서 삭제</a:t>
+            </a:r>
+            <a:br/>
+            <a:r>
+              <a:rPr lang="ko" sz="900">
+                <a:latin typeface="맑은 고딕"/>
+                <a:ea typeface="맑은 고딕"/>
+                <a:cs typeface="맑은 고딕"/>
+              </a:rPr>
+              <a:t>- [ASM] ITSM-89684 재배포</a:t>
+            </a:r>
+            <a:br/>
+            <a:r>
+              <a:rPr lang="ko" sz="900">
+                <a:latin typeface="맑은 고딕"/>
+                <a:ea typeface="맑은 고딕"/>
+                <a:cs typeface="맑은 고딕"/>
+              </a:rPr>
+              <a:t>- [ASM] ITSM-90150 작업유형 변경</a:t>
+            </a:r>
+            <a:br/>
+            <a:r>
+              <a:rPr lang="ko" sz="900">
+                <a:latin typeface="맑은 고딕"/>
+                <a:ea typeface="맑은 고딕"/>
+                <a:cs typeface="맑은 고딕"/>
+              </a:rPr>
+              <a:t>- [ASM] ITSM-89854 작업유형 변경</a:t>
+            </a:r>
+            <a:br/>
+            <a:r>
+              <a:rPr lang="ko" sz="900">
+                <a:latin typeface="맑은 고딕"/>
+                <a:ea typeface="맑은 고딕"/>
+                <a:cs typeface="맑은 고딕"/>
+              </a:rPr>
+              <a:t>- [ASM] ITSM-90286 제목 변경</a:t>
+            </a:r>
+            <a:br/>
+            <a:r>
+              <a:rPr lang="ko" sz="900">
+                <a:latin typeface="맑은 고딕"/>
+                <a:ea typeface="맑은 고딕"/>
+                <a:cs typeface="맑은 고딕"/>
+              </a:rPr>
+              <a:t>- [ASM] ITSM-90286 산출물 제거</a:t>
+            </a:r>
+            <a:br/>
+            <a:r>
+              <a:rPr lang="ko" sz="900">
+                <a:latin typeface="맑은 고딕"/>
+                <a:ea typeface="맑은 고딕"/>
+                <a:cs typeface="맑은 고딕"/>
+              </a:rPr>
+              <a:t>- [ASM] ITSM-90359 견적서 삭제</a:t>
+            </a:r>
+            <a:br/>
+            <a:r>
+              <a:rPr lang="ko" sz="900">
+                <a:latin typeface="맑은 고딕"/>
+                <a:ea typeface="맑은 고딕"/>
+                <a:cs typeface="맑은 고딕"/>
+              </a:rPr>
+              <a:t>- [ASM] ITSM-86143 변경결과 작성</a:t>
+            </a:r>
+            <a:br/>
+            <a:r>
+              <a:rPr lang="ko" sz="900">
+                <a:latin typeface="맑은 고딕"/>
+                <a:ea typeface="맑은 고딕"/>
+                <a:cs typeface="맑은 고딕"/>
+              </a:rPr>
+              <a:t>- [ASM] ITSM-90117 변경결과 작성</a:t>
+            </a:r>
+            <a:br/>
+            <a:r>
+              <a:rPr lang="ko" sz="900">
+                <a:latin typeface="맑은 고딕"/>
+                <a:ea typeface="맑은 고딕"/>
+                <a:cs typeface="맑은 고딕"/>
+              </a:rPr>
+              <a:t>- [ASM] ITSM-89832 상태 변경</a:t>
+            </a:r>
+            <a:br/>
+            <a:r>
+              <a:rPr lang="ko" sz="900">
+                <a:latin typeface="맑은 고딕"/>
+                <a:ea typeface="맑은 고딕"/>
+                <a:cs typeface="맑은 고딕"/>
+              </a:rPr>
+              <a:t>- [ASM] ITSM-90413 변경 시스템 수정</a:t>
+            </a:r>
+            <a:br/>
+            <a:r>
+              <a:rPr lang="ko" sz="900">
+                <a:latin typeface="맑은 고딕"/>
+                <a:ea typeface="맑은 고딕"/>
+                <a:cs typeface="맑은 고딕"/>
+              </a:rPr>
+              <a:t>- [ASM] ERP 권한작업 작업자 일괄 변경</a:t>
+            </a:r>
+            <a:br/>
+            <a:r>
+              <a:rPr lang="ko" sz="900">
+                <a:latin typeface="맑은 고딕"/>
+                <a:ea typeface="맑은 고딕"/>
+                <a:cs typeface="맑은 고딕"/>
+              </a:rPr>
+              <a:t>- [ATSS] 차량별시행현황 지도 개발</a:t>
+            </a:r>
+            <a:br/>
+            <a:r>
+              <a:rPr lang="ko" sz="900">
+                <a:latin typeface="맑은 고딕"/>
+                <a:ea typeface="맑은 고딕"/>
+                <a:cs typeface="맑은 고딕"/>
+              </a:rPr>
+              <a:t>- [ATSS] 대구지사 ATSS 설치 지원</a:t>
+            </a:r>
+            <a:br/>
+            <a:r>
+              <a:rPr lang="ko" sz="900">
+                <a:latin typeface="맑은 고딕"/>
+                <a:ea typeface="맑은 고딕"/>
+                <a:cs typeface="맑은 고딕"/>
+              </a:rPr>
+              <a:t>- 영천 외 5개 저유소 제외 출력 배포</a:t>
+            </a:r>
+            <a:br/>
+            <a:r>
+              <a:rPr lang="ko" sz="900">
+                <a:latin typeface="맑은 고딕"/>
+                <a:ea typeface="맑은 고딕"/>
+                <a:cs typeface="맑은 고딕"/>
+              </a:rPr>
+              <a:t>- CP 도메인 변경 개선 배포</a:t>
+            </a:r>
+            <a:br/>
+            <a:r>
+              <a:rPr lang="ko" sz="900">
+                <a:latin typeface="맑은 고딕"/>
+                <a:ea typeface="맑은 고딕"/>
+                <a:cs typeface="맑은 고딕"/>
+              </a:rPr>
+              <a:t>- 주가 도메인 변경 개선 추가 배포</a:t>
+            </a:r>
+          </a:p>
+        </p:txBody>
+      </p:sp>
+      <p:sp>
+        <p:nvSpPr>
+          <p:cNvPr id="469751754" name="Text">
+    </p:cNvPr>
+          <p:cNvSpPr>
+            <a:spLocks noGrp="1"/>
+          </p:cNvSpPr>
+          <p:nvPr/>
+        </p:nvSpPr>
+        <p:spPr>
+          <a:xfrm rot="0">
+            <a:off x="4406900" y="3251200"/>
+            <a:ext cx="635000" cy="2882900"/>
+          </a:xfrm>
+          <a:prstGeom prst="rect">
+            <a:avLst/>
+          </a:prstGeom>
+          <a:ln w="12700">
+            <a:solidFill>
+              <a:srgbClr val="000000"/>
+            </a:solidFill>
+            <a:prstDash val="solid"/>
+          </a:ln>
+        </p:spPr>
+        <p:txBody>
+          <a:bodyPr wrap="square" lIns="0" tIns="0" rIns="0" bIns="0" rtlCol="0" anchor="t"/>
+          <a:lstStyle/>
+          <a:p>
+            <a:pPr algn="ctr">
+              <a:lnSpc>
+                <a:spcPct val="100%"/>
+              </a:lnSpc>
+              <a:defRPr sz="900">
+                <a:solidFill>
+                  <a:srgbClr val="000000"/>
+                </a:solidFill>
+                <a:latin typeface="맑은 고딕"/>
+                <a:ea typeface="맑은 고딕"/>
+                <a:cs typeface="맑은 고딕"/>
+              </a:defRPr>
+            </a:pPr>
+            <a:br/>
+            <a:r>
+              <a:rPr lang="ko" sz="900">
+                <a:latin typeface="맑은 고딕"/>
+                <a:ea typeface="맑은 고딕"/>
+                <a:cs typeface="맑은 고딕"/>
+              </a:rPr>
+              <a:t>02/10</a:t>
+            </a:r>
+            <a:br/>
+            <a:r>
+              <a:rPr lang="ko" sz="900">
+                <a:latin typeface="맑은 고딕"/>
+                <a:ea typeface="맑은 고딕"/>
+                <a:cs typeface="맑은 고딕"/>
+              </a:rPr>
+              <a:t>02/10</a:t>
+            </a:r>
+            <a:br/>
+            <a:r>
+              <a:rPr lang="ko" sz="900">
+                <a:latin typeface="맑은 고딕"/>
+                <a:ea typeface="맑은 고딕"/>
+                <a:cs typeface="맑은 고딕"/>
+              </a:rPr>
+              <a:t>02/10</a:t>
+            </a:r>
+            <a:br/>
+            <a:r>
+              <a:rPr lang="ko" sz="900">
+                <a:latin typeface="맑은 고딕"/>
+                <a:ea typeface="맑은 고딕"/>
+                <a:cs typeface="맑은 고딕"/>
+              </a:rPr>
+              <a:t>01/30</a:t>
+            </a:r>
+            <a:br/>
+            <a:r>
+              <a:rPr lang="ko" sz="900">
+                <a:latin typeface="맑은 고딕"/>
+                <a:ea typeface="맑은 고딕"/>
+                <a:cs typeface="맑은 고딕"/>
+              </a:rPr>
+              <a:t>01/30</a:t>
+            </a:r>
             <a:br/>
             <a:r>
               <a:rPr lang="ko" sz="900">
@@ -1508,22 +2129,129 @@
               <a:t>01/31</a:t>
             </a:r>
             <a:br/>
-          </a:p>
-        </p:txBody>
-      </p:sp>
-      <p:sp>
-        <p:nvSpPr>
-          <p:cNvPr id="270827286" name="Text">
-    </p:cNvPr>
-          <p:cNvSpPr>
-            <a:spLocks noGrp="1"/>
-          </p:cNvSpPr>
-          <p:nvPr/>
-        </p:nvSpPr>
-        <p:spPr>
-          <a:xfrm rot="0">
-            <a:off x="9232900" y="3251200"/>
-            <a:ext cx="635000" cy="1524000"/>
+            <a:r>
+              <a:rPr lang="ko" sz="900">
+                <a:latin typeface="맑은 고딕"/>
+                <a:ea typeface="맑은 고딕"/>
+                <a:cs typeface="맑은 고딕"/>
+              </a:rPr>
+              <a:t>02/01</a:t>
+            </a:r>
+            <a:br/>
+            <a:r>
+              <a:rPr lang="ko" sz="900">
+                <a:latin typeface="맑은 고딕"/>
+                <a:ea typeface="맑은 고딕"/>
+                <a:cs typeface="맑은 고딕"/>
+              </a:rPr>
+              <a:t>02/02</a:t>
+            </a:r>
+            <a:br/>
+            <a:r>
+              <a:rPr lang="ko" sz="900">
+                <a:latin typeface="맑은 고딕"/>
+                <a:ea typeface="맑은 고딕"/>
+                <a:cs typeface="맑은 고딕"/>
+              </a:rPr>
+              <a:t>02/02</a:t>
+            </a:r>
+            <a:br/>
+            <a:r>
+              <a:rPr lang="ko" sz="900">
+                <a:latin typeface="맑은 고딕"/>
+                <a:ea typeface="맑은 고딕"/>
+                <a:cs typeface="맑은 고딕"/>
+              </a:rPr>
+              <a:t>02/02</a:t>
+            </a:r>
+            <a:br/>
+            <a:r>
+              <a:rPr lang="ko" sz="900">
+                <a:latin typeface="맑은 고딕"/>
+                <a:ea typeface="맑은 고딕"/>
+                <a:cs typeface="맑은 고딕"/>
+              </a:rPr>
+              <a:t>02/02</a:t>
+            </a:r>
+            <a:br/>
+            <a:r>
+              <a:rPr lang="ko" sz="900">
+                <a:latin typeface="맑은 고딕"/>
+                <a:ea typeface="맑은 고딕"/>
+                <a:cs typeface="맑은 고딕"/>
+              </a:rPr>
+              <a:t>02/03</a:t>
+            </a:r>
+            <a:br/>
+            <a:r>
+              <a:rPr lang="ko" sz="900">
+                <a:latin typeface="맑은 고딕"/>
+                <a:ea typeface="맑은 고딕"/>
+                <a:cs typeface="맑은 고딕"/>
+              </a:rPr>
+              <a:t>02/03</a:t>
+            </a:r>
+            <a:br/>
+            <a:r>
+              <a:rPr lang="ko" sz="900">
+                <a:latin typeface="맑은 고딕"/>
+                <a:ea typeface="맑은 고딕"/>
+                <a:cs typeface="맑은 고딕"/>
+              </a:rPr>
+              <a:t>03/03</a:t>
+            </a:r>
+            <a:br/>
+            <a:r>
+              <a:rPr lang="ko" sz="900">
+                <a:latin typeface="맑은 고딕"/>
+                <a:ea typeface="맑은 고딕"/>
+                <a:cs typeface="맑은 고딕"/>
+              </a:rPr>
+              <a:t>01/30</a:t>
+            </a:r>
+            <a:br/>
+            <a:r>
+              <a:rPr lang="ko" sz="900">
+                <a:latin typeface="맑은 고딕"/>
+                <a:ea typeface="맑은 고딕"/>
+                <a:cs typeface="맑은 고딕"/>
+              </a:rPr>
+              <a:t>02/03</a:t>
+            </a:r>
+            <a:br/>
+            <a:r>
+              <a:rPr lang="ko" sz="900">
+                <a:latin typeface="맑은 고딕"/>
+                <a:ea typeface="맑은 고딕"/>
+                <a:cs typeface="맑은 고딕"/>
+              </a:rPr>
+              <a:t>02/02</a:t>
+            </a:r>
+            <a:br/>
+            <a:r>
+              <a:rPr lang="ko" sz="900">
+                <a:latin typeface="맑은 고딕"/>
+                <a:ea typeface="맑은 고딕"/>
+                <a:cs typeface="맑은 고딕"/>
+              </a:rPr>
+              <a:t>02/02</a:t>
+            </a:r>
+          </a:p>
+        </p:txBody>
+      </p:sp>
+      <p:sp>
+        <p:nvSpPr>
+          <p:cNvPr id="1392514156" name="Text">
+    </p:cNvPr>
+          <p:cNvSpPr>
+            <a:spLocks noGrp="1"/>
+          </p:cNvSpPr>
+          <p:nvPr/>
+        </p:nvSpPr>
+        <p:spPr>
+          <a:xfrm rot="0">
+            <a:off x="5041900" y="3251200"/>
+            <a:ext cx="635000" cy="2882900"/>
           </a:xfrm>
           <a:prstGeom prst="rect">
             <a:avLst/>
@@ -1559,46 +2287,177 @@
                 <a:ea typeface="맑은 고딕"/>
                 <a:cs typeface="맑은 고딕"/>
               </a:rPr>
-              <a:t>01/11</a:t>
-            </a:r>
-            <a:br/>
-            <a:br/>
-            <a:br/>
-            <a:r>
-              <a:rPr lang="ko" sz="900">
-                <a:latin typeface="맑은 고딕"/>
-                <a:ea typeface="맑은 고딕"/>
-                <a:cs typeface="맑은 고딕"/>
-              </a:rPr>
-              <a:t>12/29</a:t>
-            </a:r>
-            <a:br/>
-            <a:br/>
-            <a:r>
-              <a:rPr lang="ko" sz="900">
-                <a:latin typeface="맑은 고딕"/>
-                <a:ea typeface="맑은 고딕"/>
-                <a:cs typeface="맑은 고딕"/>
-              </a:rPr>
-              <a:t>12/29</a:t>
-            </a:r>
-            <a:br/>
-          </a:p>
-        </p:txBody>
-      </p:sp>
-      <p:sp>
-        <p:nvSpPr>
-          <p:cNvPr id="188847698" name="Text">
-    </p:cNvPr>
-          <p:cNvSpPr>
-            <a:spLocks noGrp="1"/>
-          </p:cNvSpPr>
-          <p:nvPr/>
-        </p:nvSpPr>
-        <p:spPr>
-          <a:xfrm rot="0">
-            <a:off x="6388100" y="3251200"/>
-            <a:ext cx="2844800" cy="1524000"/>
+              <a:t>25%</a:t>
+            </a:r>
+            <a:br/>
+            <a:r>
+              <a:rPr lang="ko" sz="900">
+                <a:latin typeface="맑은 고딕"/>
+                <a:ea typeface="맑은 고딕"/>
+                <a:cs typeface="맑은 고딕"/>
+              </a:rPr>
+              <a:t>01/30</a:t>
+            </a:r>
+            <a:br/>
+            <a:r>
+              <a:rPr lang="ko" sz="900">
+                <a:latin typeface="맑은 고딕"/>
+                <a:ea typeface="맑은 고딕"/>
+                <a:cs typeface="맑은 고딕"/>
+              </a:rPr>
+              <a:t>01/30</a:t>
+            </a:r>
+            <a:br/>
+            <a:r>
+              <a:rPr lang="ko" sz="900">
+                <a:latin typeface="맑은 고딕"/>
+                <a:ea typeface="맑은 고딕"/>
+                <a:cs typeface="맑은 고딕"/>
+              </a:rPr>
+              <a:t>01/30</a:t>
+            </a:r>
+            <a:br/>
+            <a:r>
+              <a:rPr lang="ko" sz="900">
+                <a:latin typeface="맑은 고딕"/>
+                <a:ea typeface="맑은 고딕"/>
+                <a:cs typeface="맑은 고딕"/>
+              </a:rPr>
+              <a:t>01/31</a:t>
+            </a:r>
+            <a:br/>
+            <a:r>
+              <a:rPr lang="ko" sz="900">
+                <a:latin typeface="맑은 고딕"/>
+                <a:ea typeface="맑은 고딕"/>
+                <a:cs typeface="맑은 고딕"/>
+              </a:rPr>
+              <a:t>01/31</a:t>
+            </a:r>
+            <a:br/>
+            <a:r>
+              <a:rPr lang="ko" sz="900">
+                <a:latin typeface="맑은 고딕"/>
+                <a:ea typeface="맑은 고딕"/>
+                <a:cs typeface="맑은 고딕"/>
+              </a:rPr>
+              <a:t>02/01</a:t>
+            </a:r>
+            <a:br/>
+            <a:r>
+              <a:rPr lang="ko" sz="900">
+                <a:latin typeface="맑은 고딕"/>
+                <a:ea typeface="맑은 고딕"/>
+                <a:cs typeface="맑은 고딕"/>
+              </a:rPr>
+              <a:t>02/02</a:t>
+            </a:r>
+            <a:br/>
+            <a:r>
+              <a:rPr lang="ko" sz="900">
+                <a:latin typeface="맑은 고딕"/>
+                <a:ea typeface="맑은 고딕"/>
+                <a:cs typeface="맑은 고딕"/>
+              </a:rPr>
+              <a:t>02/02</a:t>
+            </a:r>
+            <a:br/>
+            <a:r>
+              <a:rPr lang="ko" sz="900">
+                <a:latin typeface="맑은 고딕"/>
+                <a:ea typeface="맑은 고딕"/>
+                <a:cs typeface="맑은 고딕"/>
+              </a:rPr>
+              <a:t>02/02</a:t>
+            </a:r>
+            <a:br/>
+            <a:r>
+              <a:rPr lang="ko" sz="900">
+                <a:latin typeface="맑은 고딕"/>
+                <a:ea typeface="맑은 고딕"/>
+                <a:cs typeface="맑은 고딕"/>
+              </a:rPr>
+              <a:t>02/02</a:t>
+            </a:r>
+            <a:br/>
+            <a:r>
+              <a:rPr lang="ko" sz="900">
+                <a:latin typeface="맑은 고딕"/>
+                <a:ea typeface="맑은 고딕"/>
+                <a:cs typeface="맑은 고딕"/>
+              </a:rPr>
+              <a:t>02/03</a:t>
+            </a:r>
+            <a:br/>
+            <a:r>
+              <a:rPr lang="ko" sz="900">
+                <a:latin typeface="맑은 고딕"/>
+                <a:ea typeface="맑은 고딕"/>
+                <a:cs typeface="맑은 고딕"/>
+              </a:rPr>
+              <a:t>02/02</a:t>
+            </a:r>
+            <a:br/>
+            <a:r>
+              <a:rPr lang="ko" sz="900">
+                <a:latin typeface="맑은 고딕"/>
+                <a:ea typeface="맑은 고딕"/>
+                <a:cs typeface="맑은 고딕"/>
+              </a:rPr>
+              <a:t>10%</a:t>
+            </a:r>
+            <a:br/>
+            <a:r>
+              <a:rPr lang="ko" sz="900">
+                <a:latin typeface="맑은 고딕"/>
+                <a:ea typeface="맑은 고딕"/>
+                <a:cs typeface="맑은 고딕"/>
+              </a:rPr>
+              <a:t>01/30</a:t>
+            </a:r>
+            <a:br/>
+            <a:r>
+              <a:rPr lang="ko" sz="900">
+                <a:latin typeface="맑은 고딕"/>
+                <a:ea typeface="맑은 고딕"/>
+                <a:cs typeface="맑은 고딕"/>
+              </a:rPr>
+              <a:t>02/03</a:t>
+            </a:r>
+            <a:br/>
+            <a:r>
+              <a:rPr lang="ko" sz="900">
+                <a:latin typeface="맑은 고딕"/>
+                <a:ea typeface="맑은 고딕"/>
+                <a:cs typeface="맑은 고딕"/>
+              </a:rPr>
+              <a:t>02/02</a:t>
+            </a:r>
+            <a:br/>
+            <a:r>
+              <a:rPr lang="ko" sz="900">
+                <a:latin typeface="맑은 고딕"/>
+                <a:ea typeface="맑은 고딕"/>
+                <a:cs typeface="맑은 고딕"/>
+              </a:rPr>
+              <a:t>02/02</a:t>
+            </a:r>
+          </a:p>
+        </p:txBody>
+      </p:sp>
+      <p:sp>
+        <p:nvSpPr>
+          <p:cNvPr id="1984073447" name="Text">
+    </p:cNvPr>
+          <p:cNvSpPr>
+            <a:spLocks noGrp="1"/>
+          </p:cNvSpPr>
+          <p:nvPr/>
+        </p:nvSpPr>
+        <p:spPr>
+          <a:xfrm rot="0">
+            <a:off x="3771900" y="3251200"/>
+            <a:ext cx="635000" cy="2882900"/>
           </a:xfrm>
           <a:prstGeom prst="rect">
             <a:avLst/>
@@ -1614,7 +2473,7 @@
           <a:bodyPr wrap="square" lIns="0" tIns="0" rIns="0" bIns="0" rtlCol="0" anchor="t"/>
           <a:lstStyle/>
           <a:p>
-            <a:pPr algn="l">
+            <a:pPr algn="ctr">
               <a:lnSpc>
                 <a:spcPct val="100%"/>
               </a:lnSpc>
@@ -1634,340 +2493,44 @@
                 <a:ea typeface="맑은 고딕"/>
                 <a:cs typeface="맑은 고딕"/>
               </a:rPr>
-              <a:t>- [RMS] DB 테이블 세부화 및 변경</a:t>
-            </a:r>
-            <a:br/>
-            <a:r>
-              <a:rPr lang="ko" sz="900">
-                <a:latin typeface="맑은 고딕"/>
-                <a:ea typeface="맑은 고딕"/>
-                <a:cs typeface="맑은 고딕"/>
-              </a:rPr>
-              <a:t>    (정규화 작업 진행 후 시스템 적용)</a:t>
-            </a:r>
-            <a:br/>
-            <a:r>
-              <a:rPr lang="ko" sz="900">
-                <a:latin typeface="맑은 고딕"/>
-                <a:ea typeface="맑은 고딕"/>
-                <a:cs typeface="맑은 고딕"/>
-              </a:rPr>
-              <a:t>    + RMS-테이블정의서 토대로 진행</a:t>
-            </a:r>
-            <a:br/>
-            <a:r>
-              <a:rPr lang="ko" sz="900">
-                <a:latin typeface="맑은 고딕"/>
-                <a:ea typeface="맑은 고딕"/>
-                <a:cs typeface="맑은 고딕"/>
-              </a:rPr>
-              <a:t>- [RMS] 1차 테스트</a:t>
-            </a:r>
-            <a:br/>
-            <a:r>
-              <a:rPr lang="ko" sz="900">
-                <a:latin typeface="맑은 고딕"/>
-                <a:ea typeface="맑은 고딕"/>
-                <a:cs typeface="맑은 고딕"/>
-              </a:rPr>
-              <a:t>    (피드백 수렴 / 에러 처리)</a:t>
-            </a:r>
-            <a:br/>
-            <a:r>
-              <a:rPr lang="ko" sz="900">
-                <a:latin typeface="맑은 고딕"/>
-                <a:ea typeface="맑은 고딕"/>
-                <a:cs typeface="맑은 고딕"/>
-              </a:rPr>
-              <a:t>- [RMS] 시스템 매뉴얼 제작</a:t>
-            </a:r>
-            <a:br/>
-            <a:r>
-              <a:rPr lang="ko" sz="900">
-                <a:latin typeface="맑은 고딕"/>
-                <a:ea typeface="맑은 고딕"/>
-                <a:cs typeface="맑은 고딕"/>
-              </a:rPr>
-              <a:t>    (사용자, pl, 관리자)</a:t>
-            </a:r>
-          </a:p>
-        </p:txBody>
-      </p:sp>
-      <p:sp>
-        <p:nvSpPr>
-          <p:cNvPr id="2091821437" name="Text">
-    </p:cNvPr>
-          <p:cNvSpPr>
-            <a:spLocks noGrp="1"/>
-          </p:cNvSpPr>
-          <p:nvPr/>
-        </p:nvSpPr>
-        <p:spPr>
-          <a:xfrm rot="0">
-            <a:off x="5753100" y="3251200"/>
-            <a:ext cx="635000" cy="1524000"/>
-          </a:xfrm>
-          <a:prstGeom prst="rect">
-            <a:avLst/>
-          </a:prstGeom>
-          <a:ln w="12700">
-            <a:solidFill>
-              <a:srgbClr val="000000"/>
-            </a:solidFill>
-            <a:prstDash val="solid"/>
-          </a:ln>
-        </p:spPr>
-        <p:txBody>
-          <a:bodyPr wrap="square" lIns="0" tIns="0" rIns="0" bIns="0" rtlCol="0" anchor="t"/>
-          <a:lstStyle/>
-          <a:p>
-            <a:pPr algn="ctr">
-              <a:lnSpc>
-                <a:spcPct val="100%"/>
-              </a:lnSpc>
-              <a:defRPr sz="900">
-                <a:solidFill>
-                  <a:srgbClr val="000000"/>
-                </a:solidFill>
-                <a:latin typeface="맑은 고딕"/>
-                <a:ea typeface="맑은 고딕"/>
-                <a:cs typeface="맑은 고딕"/>
-              </a:defRPr>
-            </a:pPr>
-            <a:br/>
-            <a:r>
-              <a:rPr lang="ko" sz="900">
-                <a:latin typeface="맑은 고딕"/>
-                <a:ea typeface="맑은 고딕"/>
-                <a:cs typeface="맑은 고딕"/>
-              </a:rPr>
-              <a:t>이지은</a:t>
-            </a:r>
-          </a:p>
-        </p:txBody>
-      </p:sp>
-      <p:sp>
-        <p:nvSpPr>
-          <p:cNvPr id="14470866" name="Text">
-    </p:cNvPr>
-          <p:cNvSpPr>
-            <a:spLocks noGrp="1"/>
-          </p:cNvSpPr>
-          <p:nvPr/>
-        </p:nvSpPr>
-        <p:spPr>
-          <a:xfrm rot="0">
-            <a:off x="165100" y="3251200"/>
-            <a:ext cx="723900" cy="1524000"/>
-          </a:xfrm>
-          <a:prstGeom prst="rect">
-            <a:avLst/>
-          </a:prstGeom>
-          <a:ln w="12700">
-            <a:solidFill>
-              <a:srgbClr val="000000"/>
-            </a:solidFill>
-            <a:prstDash val="solid"/>
-          </a:ln>
-        </p:spPr>
-        <p:txBody>
-          <a:bodyPr wrap="square" lIns="0" tIns="0" rIns="0" bIns="0" rtlCol="0" anchor="t"/>
-          <a:lstStyle/>
-          <a:p>
-            <a:pPr algn="ctr">
-              <a:lnSpc>
-                <a:spcPct val="100%"/>
-              </a:lnSpc>
-              <a:defRPr sz="900">
-                <a:solidFill>
-                  <a:srgbClr val="000000"/>
-                </a:solidFill>
-                <a:latin typeface="맑은 고딕"/>
-                <a:ea typeface="맑은 고딕"/>
-                <a:cs typeface="맑은 고딕"/>
-              </a:defRPr>
-            </a:pPr>
-            <a:br/>
-            <a:r>
-              <a:rPr lang="ko" sz="900">
-                <a:latin typeface="맑은 고딕"/>
-                <a:ea typeface="맑은 고딕"/>
-                <a:cs typeface="맑은 고딕"/>
-              </a:rPr>
-              <a:t>이지은</a:t>
-            </a:r>
-          </a:p>
-        </p:txBody>
-      </p:sp>
-      <p:sp>
-        <p:nvSpPr>
-          <p:cNvPr id="859036944" name="Text">
-    </p:cNvPr>
-          <p:cNvSpPr>
-            <a:spLocks noGrp="1"/>
-          </p:cNvSpPr>
-          <p:nvPr/>
-        </p:nvSpPr>
-        <p:spPr>
-          <a:xfrm rot="0">
-            <a:off x="889000" y="3251200"/>
-            <a:ext cx="2882900" cy="1524000"/>
-          </a:xfrm>
-          <a:prstGeom prst="rect">
-            <a:avLst/>
-          </a:prstGeom>
-          <a:ln w="12700">
-            <a:solidFill>
-              <a:srgbClr val="000000"/>
-            </a:solidFill>
-            <a:prstDash val="solid"/>
-          </a:ln>
-        </p:spPr>
-        <p:txBody>
-          <a:bodyPr wrap="square" lIns="0" tIns="0" rIns="0" bIns="0" rtlCol="0" anchor="t"/>
-          <a:lstStyle/>
-          <a:p>
-            <a:pPr algn="l">
-              <a:lnSpc>
-                <a:spcPct val="100%"/>
-              </a:lnSpc>
-              <a:defRPr sz="900">
-                <a:solidFill>
-                  <a:srgbClr val="000000"/>
-                </a:solidFill>
-                <a:latin typeface="맑은 고딕"/>
-                <a:ea typeface="맑은 고딕"/>
-                <a:cs typeface="맑은 고딕"/>
-              </a:defRPr>
-            </a:pPr>
-            <a:br/>
-            <a:r>
-              <a:rPr lang="ko" sz="900">
-                <a:latin typeface="맑은 고딕"/>
-                <a:ea typeface="맑은 고딕"/>
-                <a:cs typeface="맑은 고딕"/>
-              </a:rPr>
-              <a:t>- [RMS] DB 테이블 세부화 및 변경</a:t>
-            </a:r>
-            <a:br/>
-            <a:r>
-              <a:rPr lang="ko" sz="900">
-                <a:latin typeface="맑은 고딕"/>
-                <a:ea typeface="맑은 고딕"/>
-                <a:cs typeface="맑은 고딕"/>
-              </a:rPr>
-              <a:t>    (정규화 작업 진행 후 시스템 적용)</a:t>
-            </a:r>
-            <a:br/>
-            <a:r>
-              <a:rPr lang="ko" sz="900">
-                <a:latin typeface="맑은 고딕"/>
-                <a:ea typeface="맑은 고딕"/>
-                <a:cs typeface="맑은 고딕"/>
-              </a:rPr>
-              <a:t>    + RMS-테이블정의서 토대로 진행</a:t>
-            </a:r>
-            <a:br/>
-            <a:r>
-              <a:rPr lang="ko" sz="900">
-                <a:latin typeface="맑은 고딕"/>
-                <a:ea typeface="맑은 고딕"/>
-                <a:cs typeface="맑은 고딕"/>
-              </a:rPr>
-              <a:t>- [RMS] 1차 테스트</a:t>
-            </a:r>
-            <a:br/>
-            <a:r>
-              <a:rPr lang="ko" sz="900">
-                <a:latin typeface="맑은 고딕"/>
-                <a:ea typeface="맑은 고딕"/>
-                <a:cs typeface="맑은 고딕"/>
-              </a:rPr>
-              <a:t>    (피드백 수렴 / 에러 처리)</a:t>
-            </a:r>
-            <a:br/>
-            <a:r>
-              <a:rPr lang="ko" sz="900">
-                <a:latin typeface="맑은 고딕"/>
-                <a:ea typeface="맑은 고딕"/>
-                <a:cs typeface="맑은 고딕"/>
-              </a:rPr>
-              <a:t>- [RMS] 시스템 매뉴얼 제작</a:t>
-            </a:r>
-            <a:br/>
-            <a:r>
-              <a:rPr lang="ko" sz="900">
-                <a:latin typeface="맑은 고딕"/>
-                <a:ea typeface="맑은 고딕"/>
-                <a:cs typeface="맑은 고딕"/>
-              </a:rPr>
-              <a:t>    (사용자, pl, 관리자)</a:t>
-            </a:r>
-          </a:p>
-        </p:txBody>
-      </p:sp>
-      <p:sp>
-        <p:nvSpPr>
-          <p:cNvPr id="885468706" name="Text">
-    </p:cNvPr>
-          <p:cNvSpPr>
-            <a:spLocks noGrp="1"/>
-          </p:cNvSpPr>
-          <p:nvPr/>
-        </p:nvSpPr>
-        <p:spPr>
-          <a:xfrm rot="0">
-            <a:off x="4406900" y="3251200"/>
-            <a:ext cx="635000" cy="1524000"/>
-          </a:xfrm>
-          <a:prstGeom prst="rect">
-            <a:avLst/>
-          </a:prstGeom>
-          <a:ln w="12700">
-            <a:solidFill>
-              <a:srgbClr val="000000"/>
-            </a:solidFill>
-            <a:prstDash val="solid"/>
-          </a:ln>
-        </p:spPr>
-        <p:txBody>
-          <a:bodyPr wrap="square" lIns="0" tIns="0" rIns="0" bIns="0" rtlCol="0" anchor="t"/>
-          <a:lstStyle/>
-          <a:p>
-            <a:pPr algn="ctr">
-              <a:lnSpc>
-                <a:spcPct val="100%"/>
-              </a:lnSpc>
-              <a:defRPr sz="900">
-                <a:solidFill>
-                  <a:srgbClr val="000000"/>
-                </a:solidFill>
-                <a:latin typeface="맑은 고딕"/>
-                <a:ea typeface="맑은 고딕"/>
-                <a:cs typeface="맑은 고딕"/>
-              </a:defRPr>
-            </a:pPr>
-            <a:br/>
-            <a:r>
-              <a:rPr lang="ko" sz="900">
-                <a:latin typeface="맑은 고딕"/>
-                <a:ea typeface="맑은 고딕"/>
-                <a:cs typeface="맑은 고딕"/>
-              </a:rPr>
-              <a:t>01/20</a:t>
-            </a:r>
-            <a:br/>
-            <a:br/>
-            <a:br/>
-            <a:r>
-              <a:rPr lang="ko" sz="900">
-                <a:latin typeface="맑은 고딕"/>
-                <a:ea typeface="맑은 고딕"/>
-                <a:cs typeface="맑은 고딕"/>
-              </a:rPr>
-              <a:t>[보류]</a:t>
-            </a:r>
-            <a:br/>
+              <a:t>01/26</a:t>
+            </a:r>
+            <a:br/>
+            <a:r>
+              <a:rPr lang="ko" sz="900">
+                <a:latin typeface="맑은 고딕"/>
+                <a:ea typeface="맑은 고딕"/>
+                <a:cs typeface="맑은 고딕"/>
+              </a:rPr>
+              <a:t>01/26</a:t>
+            </a:r>
+            <a:br/>
+            <a:r>
+              <a:rPr lang="ko" sz="900">
+                <a:latin typeface="맑은 고딕"/>
+                <a:ea typeface="맑은 고딕"/>
+                <a:cs typeface="맑은 고딕"/>
+              </a:rPr>
+              <a:t>01/26</a:t>
+            </a:r>
+            <a:br/>
+            <a:r>
+              <a:rPr lang="ko" sz="900">
+                <a:latin typeface="맑은 고딕"/>
+                <a:ea typeface="맑은 고딕"/>
+                <a:cs typeface="맑은 고딕"/>
+              </a:rPr>
+              <a:t>01/30</a:t>
+            </a:r>
+            <a:br/>
+            <a:r>
+              <a:rPr lang="ko" sz="900">
+                <a:latin typeface="맑은 고딕"/>
+                <a:ea typeface="맑은 고딕"/>
+                <a:cs typeface="맑은 고딕"/>
+              </a:rPr>
+              <a:t>01/30</a:t>
+            </a:r>
             <a:br/>
             <a:r>
               <a:rPr lang="ko" sz="900">
@@ -1978,162 +2541,119 @@
               <a:t>01/31</a:t>
             </a:r>
             <a:br/>
-          </a:p>
-        </p:txBody>
-      </p:sp>
-      <p:sp>
-        <p:nvSpPr>
-          <p:cNvPr id="1034652806" name="Text">
-    </p:cNvPr>
-          <p:cNvSpPr>
-            <a:spLocks noGrp="1"/>
-          </p:cNvSpPr>
-          <p:nvPr/>
-        </p:nvSpPr>
-        <p:spPr>
-          <a:xfrm rot="0">
-            <a:off x="5041900" y="3251200"/>
-            <a:ext cx="635000" cy="1524000"/>
-          </a:xfrm>
-          <a:prstGeom prst="rect">
-            <a:avLst/>
-          </a:prstGeom>
-          <a:ln w="12700">
-            <a:solidFill>
-              <a:srgbClr val="000000"/>
-            </a:solidFill>
-            <a:prstDash val="solid"/>
-          </a:ln>
-        </p:spPr>
-        <p:txBody>
-          <a:bodyPr wrap="square" lIns="0" tIns="0" rIns="0" bIns="0" rtlCol="0" anchor="t"/>
-          <a:lstStyle/>
-          <a:p>
-            <a:pPr algn="ctr">
-              <a:lnSpc>
-                <a:spcPct val="100%"/>
-              </a:lnSpc>
-              <a:defRPr sz="900">
-                <a:solidFill>
-                  <a:srgbClr val="000000"/>
-                </a:solidFill>
-                <a:latin typeface="맑은 고딕"/>
-                <a:ea typeface="맑은 고딕"/>
-                <a:cs typeface="맑은 고딕"/>
-              </a:defRPr>
-            </a:pPr>
-            <a:br/>
-            <a:r>
-              <a:rPr lang="ko" sz="900">
-                <a:latin typeface="맑은 고딕"/>
-                <a:ea typeface="맑은 고딕"/>
-                <a:cs typeface="맑은 고딕"/>
-              </a:rPr>
-              <a:t>01/20</a:t>
-            </a:r>
-            <a:br/>
-            <a:br/>
-            <a:br/>
-            <a:r>
-              <a:rPr lang="ko" sz="900">
-                <a:latin typeface="맑은 고딕"/>
-                <a:ea typeface="맑은 고딕"/>
-                <a:cs typeface="맑은 고딕"/>
-              </a:rPr>
-              <a:t>[보류]</a:t>
-            </a:r>
-            <a:br/>
-            <a:br/>
-            <a:r>
-              <a:rPr lang="ko" sz="900">
-                <a:latin typeface="맑은 고딕"/>
-                <a:ea typeface="맑은 고딕"/>
-                <a:cs typeface="맑은 고딕"/>
-              </a:rPr>
-              <a:t>20%</a:t>
-            </a:r>
-            <a:br/>
-          </a:p>
-        </p:txBody>
-      </p:sp>
-      <p:sp>
-        <p:nvSpPr>
-          <p:cNvPr id="1541894079" name="Text">
-    </p:cNvPr>
-          <p:cNvSpPr>
-            <a:spLocks noGrp="1"/>
-          </p:cNvSpPr>
-          <p:nvPr/>
-        </p:nvSpPr>
-        <p:spPr>
-          <a:xfrm rot="0">
-            <a:off x="3771900" y="3251200"/>
-            <a:ext cx="635000" cy="1524000"/>
-          </a:xfrm>
-          <a:prstGeom prst="rect">
-            <a:avLst/>
-          </a:prstGeom>
-          <a:ln w="12700">
-            <a:solidFill>
-              <a:srgbClr val="000000"/>
-            </a:solidFill>
-            <a:prstDash val="solid"/>
-          </a:ln>
-        </p:spPr>
-        <p:txBody>
-          <a:bodyPr wrap="square" lIns="0" tIns="0" rIns="0" bIns="0" rtlCol="0" anchor="t"/>
-          <a:lstStyle/>
-          <a:p>
-            <a:pPr algn="ctr">
-              <a:lnSpc>
-                <a:spcPct val="100%"/>
-              </a:lnSpc>
-              <a:defRPr sz="900">
-                <a:solidFill>
-                  <a:srgbClr val="000000"/>
-                </a:solidFill>
-                <a:latin typeface="맑은 고딕"/>
-                <a:ea typeface="맑은 고딕"/>
-                <a:cs typeface="맑은 고딕"/>
-              </a:defRPr>
-            </a:pPr>
-            <a:br/>
-            <a:r>
-              <a:rPr lang="ko" sz="900">
-                <a:latin typeface="맑은 고딕"/>
-                <a:ea typeface="맑은 고딕"/>
-                <a:cs typeface="맑은 고딕"/>
-              </a:rPr>
-              <a:t>01/11</a:t>
-            </a:r>
-            <a:br/>
-            <a:br/>
-            <a:br/>
-            <a:r>
-              <a:rPr lang="ko" sz="900">
-                <a:latin typeface="맑은 고딕"/>
-                <a:ea typeface="맑은 고딕"/>
-                <a:cs typeface="맑은 고딕"/>
-              </a:rPr>
-              <a:t>12/29</a:t>
-            </a:r>
-            <a:br/>
-            <a:br/>
-            <a:r>
-              <a:rPr lang="ko" sz="900">
-                <a:latin typeface="맑은 고딕"/>
-                <a:ea typeface="맑은 고딕"/>
-                <a:cs typeface="맑은 고딕"/>
-              </a:rPr>
-              <a:t>12/29</a:t>
-            </a:r>
-            <a:br/>
-          </a:p>
-        </p:txBody>
-      </p:sp>
-      <p:sp>
-        <p:nvSpPr>
-          <p:cNvPr id="1989272206" name="Text">
+            <a:r>
+              <a:rPr lang="ko" sz="900">
+                <a:latin typeface="맑은 고딕"/>
+                <a:ea typeface="맑은 고딕"/>
+                <a:cs typeface="맑은 고딕"/>
+              </a:rPr>
+              <a:t>02/01</a:t>
+            </a:r>
+            <a:br/>
+            <a:r>
+              <a:rPr lang="ko" sz="900">
+                <a:latin typeface="맑은 고딕"/>
+                <a:ea typeface="맑은 고딕"/>
+                <a:cs typeface="맑은 고딕"/>
+              </a:rPr>
+              <a:t>02/02</a:t>
+            </a:r>
+            <a:br/>
+            <a:r>
+              <a:rPr lang="ko" sz="900">
+                <a:latin typeface="맑은 고딕"/>
+                <a:ea typeface="맑은 고딕"/>
+                <a:cs typeface="맑은 고딕"/>
+              </a:rPr>
+              <a:t>02/02</a:t>
+            </a:r>
+            <a:br/>
+            <a:r>
+              <a:rPr lang="ko" sz="900">
+                <a:latin typeface="맑은 고딕"/>
+                <a:ea typeface="맑은 고딕"/>
+                <a:cs typeface="맑은 고딕"/>
+              </a:rPr>
+              <a:t>02/02</a:t>
+            </a:r>
+            <a:br/>
+            <a:r>
+              <a:rPr lang="ko" sz="900">
+                <a:latin typeface="맑은 고딕"/>
+                <a:ea typeface="맑은 고딕"/>
+                <a:cs typeface="맑은 고딕"/>
+              </a:rPr>
+              <a:t>02/02</a:t>
+            </a:r>
+            <a:br/>
+            <a:r>
+              <a:rPr lang="ko" sz="900">
+                <a:latin typeface="맑은 고딕"/>
+                <a:ea typeface="맑은 고딕"/>
+                <a:cs typeface="맑은 고딕"/>
+              </a:rPr>
+              <a:t>02/03</a:t>
+            </a:r>
+            <a:br/>
+            <a:r>
+              <a:rPr lang="ko" sz="900">
+                <a:latin typeface="맑은 고딕"/>
+                <a:ea typeface="맑은 고딕"/>
+                <a:cs typeface="맑은 고딕"/>
+              </a:rPr>
+              <a:t>02/03</a:t>
+            </a:r>
+            <a:br/>
+            <a:r>
+              <a:rPr lang="ko" sz="900">
+                <a:latin typeface="맑은 고딕"/>
+                <a:ea typeface="맑은 고딕"/>
+                <a:cs typeface="맑은 고딕"/>
+              </a:rPr>
+              <a:t>01/26</a:t>
+            </a:r>
+            <a:br/>
+            <a:r>
+              <a:rPr lang="ko" sz="900">
+                <a:latin typeface="맑은 고딕"/>
+                <a:ea typeface="맑은 고딕"/>
+                <a:cs typeface="맑은 고딕"/>
+              </a:rPr>
+              <a:t>01/30</a:t>
+            </a:r>
+            <a:br/>
+            <a:r>
+              <a:rPr lang="ko" sz="900">
+                <a:latin typeface="맑은 고딕"/>
+                <a:ea typeface="맑은 고딕"/>
+                <a:cs typeface="맑은 고딕"/>
+              </a:rPr>
+              <a:t>02/02</a:t>
+            </a:r>
+            <a:br/>
+            <a:r>
+              <a:rPr lang="ko" sz="900">
+                <a:latin typeface="맑은 고딕"/>
+                <a:ea typeface="맑은 고딕"/>
+                <a:cs typeface="맑은 고딕"/>
+              </a:rPr>
+              <a:t>02/02</a:t>
+            </a:r>
+            <a:br/>
+            <a:r>
+              <a:rPr lang="ko" sz="900">
+                <a:latin typeface="맑은 고딕"/>
+                <a:ea typeface="맑은 고딕"/>
+                <a:cs typeface="맑은 고딕"/>
+              </a:rPr>
+              <a:t>02/02</a:t>
+            </a:r>
+          </a:p>
+        </p:txBody>
+      </p:sp>
+      <p:sp>
+        <p:nvSpPr>
+          <p:cNvPr id="1156259823" name="Text">
     </p:cNvPr>
           <p:cNvSpPr>
             <a:spLocks noGrp="1"/>
@@ -2179,7 +2699,7 @@
       </p:sp>
       <p:pic>
         <p:nvPicPr>
-          <p:cNvPr id="50466356" name="Picture">
+          <p:cNvPr id="216071821" name="Picture">
     </p:cNvPr>
           <p:cNvPicPr>
             <a:picLocks noChangeAspect="1"/>
@@ -2230,7 +2750,7 @@
       </p:grpSpPr>
       <p:sp>
         <p:nvSpPr>
-          <p:cNvPr id="723710560" name="Text">
+          <p:cNvPr id="1408860183" name="Text">
     </p:cNvPr>
           <p:cNvSpPr>
             <a:spLocks noGrp="1"/>
@@ -2279,7 +2799,7 @@
       </p:sp>
       <p:sp>
         <p:nvSpPr>
-          <p:cNvPr id="299680763" name="Text">
+          <p:cNvPr id="1499252484" name="Text">
     </p:cNvPr>
           <p:cNvSpPr>
             <a:spLocks noGrp="1"/>
@@ -2328,7 +2848,7 @@
       </p:sp>
       <p:sp>
         <p:nvSpPr>
-          <p:cNvPr id="454767129" name="Line"/>
+          <p:cNvPr id="219714552" name="Line"/>
           <p:cNvSpPr>
             <a:spLocks noGrp="1"/>
           </p:cNvSpPr>
@@ -2362,7 +2882,7 @@
       </p:sp>
       <p:sp>
         <p:nvSpPr>
-          <p:cNvPr id="142339296" name="Text">
+          <p:cNvPr id="101126208" name="Text">
     </p:cNvPr>
           <p:cNvSpPr>
             <a:spLocks noGrp="1"/>
@@ -2408,7 +2928,7 @@
       </p:sp>
       <p:sp>
         <p:nvSpPr>
-          <p:cNvPr id="880193149" name="Text">
+          <p:cNvPr id="425841071" name="Text">
     </p:cNvPr>
           <p:cNvSpPr>
             <a:spLocks noGrp="1"/>
@@ -2472,7 +2992,7 @@
       </p:sp>
       <p:sp>
         <p:nvSpPr>
-          <p:cNvPr id="1136812051" name="Text">
+          <p:cNvPr id="641352032" name="Text">
     </p:cNvPr>
           <p:cNvSpPr>
             <a:spLocks noGrp="1"/>
@@ -2527,7 +3047,7 @@
       </p:sp>
       <p:sp>
         <p:nvSpPr>
-          <p:cNvPr id="25889160" name="Text">
+          <p:cNvPr id="1869906188" name="Text">
     </p:cNvPr>
           <p:cNvSpPr>
             <a:spLocks noGrp="1"/>
@@ -2582,7 +3102,7 @@
       </p:sp>
       <p:sp>
         <p:nvSpPr>
-          <p:cNvPr id="1447098805" name="Text">
+          <p:cNvPr id="1372527026" name="Text">
     </p:cNvPr>
           <p:cNvSpPr>
             <a:spLocks noGrp="1"/>
@@ -2646,7 +3166,7 @@
       </p:sp>
       <p:sp>
         <p:nvSpPr>
-          <p:cNvPr id="1464115270" name="Text">
+          <p:cNvPr id="1186223757" name="Text">
     </p:cNvPr>
           <p:cNvSpPr>
             <a:spLocks noGrp="1"/>
@@ -2710,7 +3230,7 @@
       </p:sp>
       <p:sp>
         <p:nvSpPr>
-          <p:cNvPr id="123109445" name="Text">
+          <p:cNvPr id="854670970" name="Text">
     </p:cNvPr>
           <p:cNvSpPr>
             <a:spLocks noGrp="1"/>
@@ -2765,7 +3285,7 @@
       </p:sp>
       <p:sp>
         <p:nvSpPr>
-          <p:cNvPr id="1590169198" name="Text">
+          <p:cNvPr id="2034677193" name="Text">
     </p:cNvPr>
           <p:cNvSpPr>
             <a:spLocks noGrp="1"/>
@@ -2820,7 +3340,7 @@
       </p:sp>
       <p:sp>
         <p:nvSpPr>
-          <p:cNvPr id="261413203" name="Text">
+          <p:cNvPr id="1349333466" name="Text">
     </p:cNvPr>
           <p:cNvSpPr>
             <a:spLocks noGrp="1"/>
@@ -2884,7 +3404,7 @@
       </p:sp>
       <p:sp>
         <p:nvSpPr>
-          <p:cNvPr id="2099256951" name="Text">
+          <p:cNvPr id="873006436" name="Text">
     </p:cNvPr>
           <p:cNvSpPr>
             <a:spLocks noGrp="1"/>
@@ -2948,7 +3468,7 @@
       </p:sp>
       <p:sp>
         <p:nvSpPr>
-          <p:cNvPr id="1321725246" name="Text">
+          <p:cNvPr id="254865265" name="Text">
     </p:cNvPr>
           <p:cNvSpPr>
             <a:spLocks noGrp="1"/>
@@ -2958,7 +3478,7 @@
         <p:spPr>
           <a:xfrm rot="0">
             <a:off x="9867900" y="1689100"/>
-            <a:ext cx="635000" cy="3187700"/>
+            <a:ext cx="635000" cy="1524000"/>
           </a:xfrm>
           <a:prstGeom prst="rect">
             <a:avLst/>
@@ -2994,41 +3514,34 @@
                 <a:ea typeface="맑은 고딕"/>
                 <a:cs typeface="맑은 고딕"/>
               </a:rPr>
-              <a:t>01/27</a:t>
-            </a:r>
-            <a:br/>
-            <a:r>
-              <a:rPr lang="ko" sz="900">
-                <a:latin typeface="맑은 고딕"/>
-                <a:ea typeface="맑은 고딕"/>
-                <a:cs typeface="맑은 고딕"/>
-              </a:rPr>
-              <a:t>02/05</a:t>
-            </a:r>
-            <a:br/>
-            <a:r>
-              <a:rPr lang="ko" sz="900">
-                <a:latin typeface="맑은 고딕"/>
-                <a:ea typeface="맑은 고딕"/>
-                <a:cs typeface="맑은 고딕"/>
-              </a:rPr>
-              <a:t>02/15</a:t>
-            </a:r>
-            <a:br/>
-            <a:r>
-              <a:rPr lang="ko" sz="900">
-                <a:latin typeface="맑은 고딕"/>
-                <a:ea typeface="맑은 고딕"/>
-                <a:cs typeface="맑은 고딕"/>
-              </a:rPr>
               <a:t>01/31</a:t>
             </a:r>
-          </a:p>
-        </p:txBody>
-      </p:sp>
-      <p:sp>
-        <p:nvSpPr>
-          <p:cNvPr id="1348612598" name="Text">
+            <a:br/>
+            <a:br/>
+            <a:r>
+              <a:rPr lang="ko" sz="900">
+                <a:latin typeface="맑은 고딕"/>
+                <a:ea typeface="맑은 고딕"/>
+                <a:cs typeface="맑은 고딕"/>
+              </a:rPr>
+              <a:t>02/28</a:t>
+            </a:r>
+            <a:br/>
+            <a:br/>
+            <a:r>
+              <a:rPr lang="ko" sz="900">
+                <a:latin typeface="맑은 고딕"/>
+                <a:ea typeface="맑은 고딕"/>
+                <a:cs typeface="맑은 고딕"/>
+              </a:rPr>
+              <a:t>[보류]</a:t>
+            </a:r>
+          </a:p>
+        </p:txBody>
+      </p:sp>
+      <p:sp>
+        <p:nvSpPr>
+          <p:cNvPr id="1133837219" name="Text">
     </p:cNvPr>
           <p:cNvSpPr>
             <a:spLocks noGrp="1"/>
@@ -3038,7 +3551,7 @@
         <p:spPr>
           <a:xfrm rot="0">
             <a:off x="9232900" y="1689100"/>
-            <a:ext cx="635000" cy="3187700"/>
+            <a:ext cx="635000" cy="1524000"/>
           </a:xfrm>
           <a:prstGeom prst="rect">
             <a:avLst/>
@@ -3074,41 +3587,34 @@
                 <a:ea typeface="맑은 고딕"/>
                 <a:cs typeface="맑은 고딕"/>
               </a:rPr>
-              <a:t>01/26</a:t>
-            </a:r>
-            <a:br/>
-            <a:r>
-              <a:rPr lang="ko" sz="900">
-                <a:latin typeface="맑은 고딕"/>
-                <a:ea typeface="맑은 고딕"/>
-                <a:cs typeface="맑은 고딕"/>
-              </a:rPr>
-              <a:t>01/26</a:t>
-            </a:r>
-            <a:br/>
-            <a:r>
-              <a:rPr lang="ko" sz="900">
-                <a:latin typeface="맑은 고딕"/>
-                <a:ea typeface="맑은 고딕"/>
-                <a:cs typeface="맑은 고딕"/>
-              </a:rPr>
-              <a:t>01/26</a:t>
-            </a:r>
-            <a:br/>
-            <a:r>
-              <a:rPr lang="ko" sz="900">
-                <a:latin typeface="맑은 고딕"/>
-                <a:ea typeface="맑은 고딕"/>
-                <a:cs typeface="맑은 고딕"/>
-              </a:rPr>
-              <a:t>01/26</a:t>
-            </a:r>
-          </a:p>
-        </p:txBody>
-      </p:sp>
-      <p:sp>
-        <p:nvSpPr>
-          <p:cNvPr id="2031432936" name="Text">
+              <a:t>01/02</a:t>
+            </a:r>
+            <a:br/>
+            <a:br/>
+            <a:r>
+              <a:rPr lang="ko" sz="900">
+                <a:latin typeface="맑은 고딕"/>
+                <a:ea typeface="맑은 고딕"/>
+                <a:cs typeface="맑은 고딕"/>
+              </a:rPr>
+              <a:t>02/01</a:t>
+            </a:r>
+            <a:br/>
+            <a:br/>
+            <a:r>
+              <a:rPr lang="ko" sz="900">
+                <a:latin typeface="맑은 고딕"/>
+                <a:ea typeface="맑은 고딕"/>
+                <a:cs typeface="맑은 고딕"/>
+              </a:rPr>
+              <a:t>02/07</a:t>
+            </a:r>
+          </a:p>
+        </p:txBody>
+      </p:sp>
+      <p:sp>
+        <p:nvSpPr>
+          <p:cNvPr id="2051994090" name="Text">
     </p:cNvPr>
           <p:cNvSpPr>
             <a:spLocks noGrp="1"/>
@@ -3118,7 +3624,7 @@
         <p:spPr>
           <a:xfrm rot="0">
             <a:off x="6388100" y="1689100"/>
-            <a:ext cx="2844800" cy="3187700"/>
+            <a:ext cx="2844800" cy="1524000"/>
           </a:xfrm>
           <a:prstGeom prst="rect">
             <a:avLst/>
@@ -3154,41 +3660,50 @@
                 <a:ea typeface="맑은 고딕"/>
                 <a:cs typeface="맑은 고딕"/>
               </a:rPr>
-              <a:t>- [ASM] JIRA 변경 관리 요청 업무</a:t>
-            </a:r>
-            <a:br/>
-            <a:r>
-              <a:rPr lang="ko" sz="900">
-                <a:latin typeface="맑은 고딕"/>
-                <a:ea typeface="맑은 고딕"/>
-                <a:cs typeface="맑은 고딕"/>
-              </a:rPr>
-              <a:t>- [ASM] 자동 배포 진행(GCMS)</a:t>
-            </a:r>
-            <a:br/>
-            <a:r>
-              <a:rPr lang="ko" sz="900">
-                <a:latin typeface="맑은 고딕"/>
-                <a:ea typeface="맑은 고딕"/>
-                <a:cs typeface="맑은 고딕"/>
-              </a:rPr>
-              <a:t>- [ATSS] 거리 데이터 쿼리 수정 개발</a:t>
-            </a:r>
-            <a:br/>
-            <a:r>
-              <a:rPr lang="ko" sz="900">
-                <a:latin typeface="맑은 고딕"/>
-                <a:ea typeface="맑은 고딕"/>
-                <a:cs typeface="맑은 고딕"/>
-              </a:rPr>
-              <a:t>- [mobile] G/W CP 도메인 변경</a:t>
-            </a:r>
-          </a:p>
-        </p:txBody>
-      </p:sp>
-      <p:sp>
-        <p:nvSpPr>
-          <p:cNvPr id="79388187" name="Text">
+              <a:t>- [E-Approval] CP 전자결재를 통한 Vendor Print 관리 </a:t>
+            </a:r>
+            <a:br/>
+            <a:r>
+              <a:rPr lang="ko" sz="900">
+                <a:latin typeface="맑은 고딕"/>
+                <a:ea typeface="맑은 고딕"/>
+                <a:cs typeface="맑은 고딕"/>
+              </a:rPr>
+              <a:t>체계 개선</a:t>
+            </a:r>
+            <a:br/>
+            <a:r>
+              <a:rPr lang="ko" sz="900">
+                <a:latin typeface="맑은 고딕"/>
+                <a:ea typeface="맑은 고딕"/>
+                <a:cs typeface="맑은 고딕"/>
+              </a:rPr>
+              <a:t>- [TPMS] 사이버보안 컴플라이언스 점검 결과에 따른 </a:t>
+            </a:r>
+            <a:br/>
+            <a:r>
+              <a:rPr lang="ko" sz="900">
+                <a:latin typeface="맑은 고딕"/>
+                <a:ea typeface="맑은 고딕"/>
+                <a:cs typeface="맑은 고딕"/>
+              </a:rPr>
+              <a:t>개선 건</a:t>
+            </a:r>
+            <a:br/>
+            <a:r>
+              <a:rPr lang="ko" sz="900">
+                <a:latin typeface="맑은 고딕"/>
+                <a:ea typeface="맑은 고딕"/>
+                <a:cs typeface="맑은 고딕"/>
+              </a:rPr>
+              <a:t>- [E-Approval] 임원정렬순서 조건 추가에 따른 기능 개발</a:t>
+            </a:r>
+          </a:p>
+        </p:txBody>
+      </p:sp>
+      <p:sp>
+        <p:nvSpPr>
+          <p:cNvPr id="101775842" name="Text">
     </p:cNvPr>
           <p:cNvSpPr>
             <a:spLocks noGrp="1"/>
@@ -3198,7 +3713,7 @@
         <p:spPr>
           <a:xfrm rot="0">
             <a:off x="5753100" y="1689100"/>
-            <a:ext cx="635000" cy="3187700"/>
+            <a:ext cx="635000" cy="1524000"/>
           </a:xfrm>
           <a:prstGeom prst="rect">
             <a:avLst/>
@@ -3234,50 +3749,32 @@
                 <a:ea typeface="맑은 고딕"/>
                 <a:cs typeface="맑은 고딕"/>
               </a:rPr>
-              <a:t>ATSS</a:t>
-            </a:r>
-            <a:br/>
-            <a:r>
-              <a:rPr lang="ko" sz="900">
-                <a:latin typeface="맑은 고딕"/>
-                <a:ea typeface="맑은 고딕"/>
-                <a:cs typeface="맑은 고딕"/>
-              </a:rPr>
-              <a:t>/ASM</a:t>
-            </a:r>
-            <a:br/>
-            <a:r>
-              <a:rPr lang="ko" sz="900">
-                <a:latin typeface="맑은 고딕"/>
-                <a:ea typeface="맑은 고딕"/>
-                <a:cs typeface="맑은 고딕"/>
-              </a:rPr>
-              <a:t>/Mobile</a:t>
-            </a:r>
-            <a:br/>
-            <a:r>
-              <a:rPr lang="ko" sz="900">
-                <a:latin typeface="맑은 고딕"/>
-                <a:ea typeface="맑은 고딕"/>
-                <a:cs typeface="맑은 고딕"/>
-              </a:rPr>
-              <a:t>/Admin관리</a:t>
-            </a:r>
-            <a:br/>
-            <a:r>
-              <a:rPr lang="ko" sz="900">
-                <a:latin typeface="맑은 고딕"/>
-                <a:ea typeface="맑은 고딕"/>
-                <a:cs typeface="맑은 고딕"/>
-              </a:rPr>
-              <a:t>박민우</a:t>
-            </a:r>
-          </a:p>
-        </p:txBody>
-      </p:sp>
-      <p:sp>
-        <p:nvSpPr>
-          <p:cNvPr id="1977941423" name="Text">
+              <a:t>E-Approval</a:t>
+            </a:r>
+            <a:br/>
+            <a:r>
+              <a:rPr lang="ko" sz="900">
+                <a:latin typeface="맑은 고딕"/>
+                <a:ea typeface="맑은 고딕"/>
+                <a:cs typeface="맑은 고딕"/>
+              </a:rPr>
+              <a:t>/TPMS</a:t>
+            </a:r>
+            <a:br/>
+            <a:r>
+              <a:rPr lang="ko" sz="900">
+                <a:latin typeface="맑은 고딕"/>
+                <a:ea typeface="맑은 고딕"/>
+                <a:cs typeface="맑은 고딕"/>
+              </a:rPr>
+              <a:t>배영식</a:t>
+            </a:r>
+          </a:p>
+        </p:txBody>
+      </p:sp>
+      <p:sp>
+        <p:nvSpPr>
+          <p:cNvPr id="248763702" name="Text">
     </p:cNvPr>
           <p:cNvSpPr>
             <a:spLocks noGrp="1"/>
@@ -3287,7 +3784,7 @@
         <p:spPr>
           <a:xfrm rot="0">
             <a:off x="165100" y="1689100"/>
-            <a:ext cx="723900" cy="3187700"/>
+            <a:ext cx="723900" cy="1524000"/>
           </a:xfrm>
           <a:prstGeom prst="rect">
             <a:avLst/>
@@ -3323,50 +3820,32 @@
                 <a:ea typeface="맑은 고딕"/>
                 <a:cs typeface="맑은 고딕"/>
               </a:rPr>
-              <a:t>ATSS</a:t>
-            </a:r>
-            <a:br/>
-            <a:r>
-              <a:rPr lang="ko" sz="900">
-                <a:latin typeface="맑은 고딕"/>
-                <a:ea typeface="맑은 고딕"/>
-                <a:cs typeface="맑은 고딕"/>
-              </a:rPr>
-              <a:t>/ASM</a:t>
-            </a:r>
-            <a:br/>
-            <a:r>
-              <a:rPr lang="ko" sz="900">
-                <a:latin typeface="맑은 고딕"/>
-                <a:ea typeface="맑은 고딕"/>
-                <a:cs typeface="맑은 고딕"/>
-              </a:rPr>
-              <a:t>/Mobile</a:t>
-            </a:r>
-            <a:br/>
-            <a:r>
-              <a:rPr lang="ko" sz="900">
-                <a:latin typeface="맑은 고딕"/>
-                <a:ea typeface="맑은 고딕"/>
-                <a:cs typeface="맑은 고딕"/>
-              </a:rPr>
-              <a:t>/Admin관리</a:t>
-            </a:r>
-            <a:br/>
-            <a:r>
-              <a:rPr lang="ko" sz="900">
-                <a:latin typeface="맑은 고딕"/>
-                <a:ea typeface="맑은 고딕"/>
-                <a:cs typeface="맑은 고딕"/>
-              </a:rPr>
-              <a:t>박민우</a:t>
-            </a:r>
-          </a:p>
-        </p:txBody>
-      </p:sp>
-      <p:sp>
-        <p:nvSpPr>
-          <p:cNvPr id="885563236" name="Text">
+              <a:t>E-Approval</a:t>
+            </a:r>
+            <a:br/>
+            <a:r>
+              <a:rPr lang="ko" sz="900">
+                <a:latin typeface="맑은 고딕"/>
+                <a:ea typeface="맑은 고딕"/>
+                <a:cs typeface="맑은 고딕"/>
+              </a:rPr>
+              <a:t>/TPMS</a:t>
+            </a:r>
+            <a:br/>
+            <a:r>
+              <a:rPr lang="ko" sz="900">
+                <a:latin typeface="맑은 고딕"/>
+                <a:ea typeface="맑은 고딕"/>
+                <a:cs typeface="맑은 고딕"/>
+              </a:rPr>
+              <a:t>배영식</a:t>
+            </a:r>
+          </a:p>
+        </p:txBody>
+      </p:sp>
+      <p:sp>
+        <p:nvSpPr>
+          <p:cNvPr id="1786670764" name="Text">
     </p:cNvPr>
           <p:cNvSpPr>
             <a:spLocks noGrp="1"/>
@@ -3376,7 +3855,7 @@
         <p:spPr>
           <a:xfrm rot="0">
             <a:off x="889000" y="1689100"/>
-            <a:ext cx="2882900" cy="3187700"/>
+            <a:ext cx="2882900" cy="1524000"/>
           </a:xfrm>
           <a:prstGeom prst="rect">
             <a:avLst/>
@@ -3412,185 +3891,68 @@
                 <a:ea typeface="맑은 고딕"/>
                 <a:cs typeface="맑은 고딕"/>
               </a:rPr>
-              <a:t>- [ASM] ITSM-89263 재배포</a:t>
-            </a:r>
-            <a:br/>
-            <a:r>
-              <a:rPr lang="ko" sz="900">
-                <a:latin typeface="맑은 고딕"/>
-                <a:ea typeface="맑은 고딕"/>
-                <a:cs typeface="맑은 고딕"/>
-              </a:rPr>
-              <a:t>- [ASM] ITSM-88844 변경완료</a:t>
-            </a:r>
-            <a:br/>
-            <a:r>
-              <a:rPr lang="ko" sz="900">
-                <a:latin typeface="맑은 고딕"/>
-                <a:ea typeface="맑은 고딕"/>
-                <a:cs typeface="맑은 고딕"/>
-              </a:rPr>
-              <a:t>- [ASM] ITSM-88361 변경승인자 변경</a:t>
-            </a:r>
-            <a:br/>
-            <a:r>
-              <a:rPr lang="ko" sz="900">
-                <a:latin typeface="맑은 고딕"/>
-                <a:ea typeface="맑은 고딕"/>
-                <a:cs typeface="맑은 고딕"/>
-              </a:rPr>
-              <a:t>- [ASM] ITSM-86313 재배포</a:t>
-            </a:r>
-            <a:br/>
-            <a:r>
-              <a:rPr lang="ko" sz="900">
-                <a:latin typeface="맑은 고딕"/>
-                <a:ea typeface="맑은 고딕"/>
-                <a:cs typeface="맑은 고딕"/>
-              </a:rPr>
-              <a:t>- [ASM] ITSM-89623 삭제</a:t>
-            </a:r>
-            <a:br/>
-            <a:r>
-              <a:rPr lang="ko" sz="900">
-                <a:latin typeface="맑은 고딕"/>
-                <a:ea typeface="맑은 고딕"/>
-                <a:cs typeface="맑은 고딕"/>
-              </a:rPr>
-              <a:t>- [ASM] ITSM-89678 작업완료</a:t>
-            </a:r>
-            <a:br/>
-            <a:r>
-              <a:rPr lang="ko" sz="900">
-                <a:latin typeface="맑은 고딕"/>
-                <a:ea typeface="맑은 고딕"/>
-                <a:cs typeface="맑은 고딕"/>
-              </a:rPr>
-              <a:t>- [ASM] ITSM-86313 재배포</a:t>
-            </a:r>
-            <a:br/>
-            <a:r>
-              <a:rPr lang="ko" sz="900">
-                <a:latin typeface="맑은 고딕"/>
-                <a:ea typeface="맑은 고딕"/>
-                <a:cs typeface="맑은 고딕"/>
-              </a:rPr>
-              <a:t>- [ASM] ITSM-89250 작업유형 변경 및 </a:t>
-            </a:r>
-            <a:br/>
-            <a:r>
-              <a:rPr lang="ko" sz="900">
-                <a:latin typeface="맑은 고딕"/>
-                <a:ea typeface="맑은 고딕"/>
-                <a:cs typeface="맑은 고딕"/>
-              </a:rPr>
-              <a:t>데이터 작업서 삭제</a:t>
-            </a:r>
-            <a:br/>
-            <a:r>
-              <a:rPr lang="ko" sz="900">
-                <a:latin typeface="맑은 고딕"/>
-                <a:ea typeface="맑은 고딕"/>
-                <a:cs typeface="맑은 고딕"/>
-              </a:rPr>
-              <a:t>- [ASM] ITSM-89252 작업유형 변경 및 </a:t>
-            </a:r>
-            <a:br/>
-            <a:r>
-              <a:rPr lang="ko" sz="900">
-                <a:latin typeface="맑은 고딕"/>
-                <a:ea typeface="맑은 고딕"/>
-                <a:cs typeface="맑은 고딕"/>
-              </a:rPr>
-              <a:t>데이터 작업서 삭제</a:t>
-            </a:r>
-            <a:br/>
-            <a:r>
-              <a:rPr lang="ko" sz="900">
-                <a:latin typeface="맑은 고딕"/>
-                <a:ea typeface="맑은 고딕"/>
-                <a:cs typeface="맑은 고딕"/>
-              </a:rPr>
-              <a:t>- [ASM] 자동 배포 반영 시스템 배포 계정 작성</a:t>
-            </a:r>
-            <a:br/>
-            <a:r>
-              <a:rPr lang="ko" sz="900">
-                <a:latin typeface="맑은 고딕"/>
-                <a:ea typeface="맑은 고딕"/>
-                <a:cs typeface="맑은 고딕"/>
-              </a:rPr>
-              <a:t>- [ASM] 기준정보(Interlock) 수정</a:t>
-            </a:r>
-            <a:br/>
-            <a:r>
-              <a:rPr lang="ko" sz="900">
-                <a:latin typeface="맑은 고딕"/>
-                <a:ea typeface="맑은 고딕"/>
-                <a:cs typeface="맑은 고딕"/>
-              </a:rPr>
-              <a:t>- [ASM] ITSM-89786 서비스 요청서 삭제</a:t>
-            </a:r>
-            <a:br/>
-            <a:r>
-              <a:rPr lang="ko" sz="900">
-                <a:latin typeface="맑은 고딕"/>
-                <a:ea typeface="맑은 고딕"/>
-                <a:cs typeface="맑은 고딕"/>
-              </a:rPr>
-              <a:t>- [ASM] ITSM-80032 스텝 변경</a:t>
-            </a:r>
-            <a:br/>
-            <a:r>
-              <a:rPr lang="ko" sz="900">
-                <a:latin typeface="맑은 고딕"/>
-                <a:ea typeface="맑은 고딕"/>
-                <a:cs typeface="맑은 고딕"/>
-              </a:rPr>
-              <a:t>- [ASM] GCMS 자동 배포 개발</a:t>
-            </a:r>
-            <a:br/>
-            <a:r>
-              <a:rPr lang="ko" sz="900">
-                <a:latin typeface="맑은 고딕"/>
-                <a:ea typeface="맑은 고딕"/>
-                <a:cs typeface="맑은 고딕"/>
-              </a:rPr>
-              <a:t>- [ATSS] ATSS 영업그룹관리 데이터 변경</a:t>
-            </a:r>
-            <a:br/>
-            <a:r>
-              <a:rPr lang="ko" sz="900">
-                <a:latin typeface="맑은 고딕"/>
-                <a:ea typeface="맑은 고딕"/>
-                <a:cs typeface="맑은 고딕"/>
-              </a:rPr>
-              <a:t>- [ATSS] ATSS 영천저유소 제외 개선 개발</a:t>
-            </a:r>
-            <a:br/>
-            <a:r>
-              <a:rPr lang="ko" sz="900">
-                <a:latin typeface="맑은 고딕"/>
-                <a:ea typeface="맑은 고딕"/>
-                <a:cs typeface="맑은 고딕"/>
-              </a:rPr>
-              <a:t>- [mobile] CP 도메인 변경 개선 개발</a:t>
-            </a:r>
-            <a:br/>
-            <a:r>
-              <a:rPr lang="ko" sz="900">
-                <a:latin typeface="맑은 고딕"/>
-                <a:ea typeface="맑은 고딕"/>
-                <a:cs typeface="맑은 고딕"/>
-              </a:rPr>
-              <a:t>- [mobile] 주가 도메인 변경 개선 개발</a:t>
-            </a:r>
-          </a:p>
-        </p:txBody>
-      </p:sp>
-      <p:sp>
-        <p:nvSpPr>
-          <p:cNvPr id="1680494433" name="Text">
+              <a:t>- [E-Approval] 엔지니어 특근계획서 전산화</a:t>
+            </a:r>
+            <a:br/>
+            <a:r>
+              <a:rPr lang="ko" sz="900">
+                <a:latin typeface="맑은 고딕"/>
+                <a:ea typeface="맑은 고딕"/>
+                <a:cs typeface="맑은 고딕"/>
+              </a:rPr>
+              <a:t>- [E-Approval] 예외근무신청서_근무시간 특근발생 </a:t>
+            </a:r>
+            <a:br/>
+            <a:r>
+              <a:rPr lang="ko" sz="900">
+                <a:latin typeface="맑은 고딕"/>
+                <a:ea typeface="맑은 고딕"/>
+                <a:cs typeface="맑은 고딕"/>
+              </a:rPr>
+              <a:t>기능 추가 요청</a:t>
+            </a:r>
+            <a:br/>
+            <a:r>
+              <a:rPr lang="ko" sz="900">
+                <a:latin typeface="맑은 고딕"/>
+                <a:ea typeface="맑은 고딕"/>
+                <a:cs typeface="맑은 고딕"/>
+              </a:rPr>
+              <a:t>- [E-Approval] CP 전자결재를 통한 Vendor Print 관리 </a:t>
+            </a:r>
+            <a:br/>
+            <a:r>
+              <a:rPr lang="ko" sz="900">
+                <a:latin typeface="맑은 고딕"/>
+                <a:ea typeface="맑은 고딕"/>
+                <a:cs typeface="맑은 고딕"/>
+              </a:rPr>
+              <a:t>체계 개선</a:t>
+            </a:r>
+            <a:br/>
+            <a:r>
+              <a:rPr lang="ko" sz="900">
+                <a:latin typeface="맑은 고딕"/>
+                <a:ea typeface="맑은 고딕"/>
+                <a:cs typeface="맑은 고딕"/>
+              </a:rPr>
+              <a:t>- [TPMS] 사이버보안 컴플라이언스 점검 결과에 따른 </a:t>
+            </a:r>
+            <a:br/>
+            <a:r>
+              <a:rPr lang="ko" sz="900">
+                <a:latin typeface="맑은 고딕"/>
+                <a:ea typeface="맑은 고딕"/>
+                <a:cs typeface="맑은 고딕"/>
+              </a:rPr>
+              <a:t>개선 건</a:t>
+            </a:r>
+          </a:p>
+        </p:txBody>
+      </p:sp>
+      <p:sp>
+        <p:nvSpPr>
+          <p:cNvPr id="1739719592" name="Text">
     </p:cNvPr>
           <p:cNvSpPr>
             <a:spLocks noGrp="1"/>
@@ -3600,7 +3962,7 @@
         <p:spPr>
           <a:xfrm rot="0">
             <a:off x="4406900" y="1689100"/>
-            <a:ext cx="635000" cy="3187700"/>
+            <a:ext cx="635000" cy="1524000"/>
           </a:xfrm>
           <a:prstGeom prst="rect">
             <a:avLst/>
@@ -3636,152 +3998,6 @@
                 <a:ea typeface="맑은 고딕"/>
                 <a:cs typeface="맑은 고딕"/>
               </a:rPr>
-              <a:t>01/16</a:t>
-            </a:r>
-            <a:br/>
-            <a:r>
-              <a:rPr lang="ko" sz="900">
-                <a:latin typeface="맑은 고딕"/>
-                <a:ea typeface="맑은 고딕"/>
-                <a:cs typeface="맑은 고딕"/>
-              </a:rPr>
-              <a:t>01/17</a:t>
-            </a:r>
-            <a:br/>
-            <a:r>
-              <a:rPr lang="ko" sz="900">
-                <a:latin typeface="맑은 고딕"/>
-                <a:ea typeface="맑은 고딕"/>
-                <a:cs typeface="맑은 고딕"/>
-              </a:rPr>
-              <a:t>01/17</a:t>
-            </a:r>
-            <a:br/>
-            <a:r>
-              <a:rPr lang="ko" sz="900">
-                <a:latin typeface="맑은 고딕"/>
-                <a:ea typeface="맑은 고딕"/>
-                <a:cs typeface="맑은 고딕"/>
-              </a:rPr>
-              <a:t>01/18</a:t>
-            </a:r>
-            <a:br/>
-            <a:r>
-              <a:rPr lang="ko" sz="900">
-                <a:latin typeface="맑은 고딕"/>
-                <a:ea typeface="맑은 고딕"/>
-                <a:cs typeface="맑은 고딕"/>
-              </a:rPr>
-              <a:t>01/19</a:t>
-            </a:r>
-            <a:br/>
-            <a:r>
-              <a:rPr lang="ko" sz="900">
-                <a:latin typeface="맑은 고딕"/>
-                <a:ea typeface="맑은 고딕"/>
-                <a:cs typeface="맑은 고딕"/>
-              </a:rPr>
-              <a:t>01/19</a:t>
-            </a:r>
-            <a:br/>
-            <a:r>
-              <a:rPr lang="ko" sz="900">
-                <a:latin typeface="맑은 고딕"/>
-                <a:ea typeface="맑은 고딕"/>
-                <a:cs typeface="맑은 고딕"/>
-              </a:rPr>
-              <a:t>01/19</a:t>
-            </a:r>
-            <a:br/>
-            <a:r>
-              <a:rPr lang="ko" sz="900">
-                <a:latin typeface="맑은 고딕"/>
-                <a:ea typeface="맑은 고딕"/>
-                <a:cs typeface="맑은 고딕"/>
-              </a:rPr>
-              <a:t>01/19</a:t>
-            </a:r>
-            <a:br/>
-            <a:br/>
-            <a:r>
-              <a:rPr lang="ko" sz="900">
-                <a:latin typeface="맑은 고딕"/>
-                <a:ea typeface="맑은 고딕"/>
-                <a:cs typeface="맑은 고딕"/>
-              </a:rPr>
-              <a:t>01/19</a:t>
-            </a:r>
-            <a:br/>
-            <a:br/>
-            <a:r>
-              <a:rPr lang="ko" sz="900">
-                <a:latin typeface="맑은 고딕"/>
-                <a:ea typeface="맑은 고딕"/>
-                <a:cs typeface="맑은 고딕"/>
-              </a:rPr>
-              <a:t>01/19</a:t>
-            </a:r>
-            <a:br/>
-            <a:r>
-              <a:rPr lang="ko" sz="900">
-                <a:latin typeface="맑은 고딕"/>
-                <a:ea typeface="맑은 고딕"/>
-                <a:cs typeface="맑은 고딕"/>
-              </a:rPr>
-              <a:t>01/20</a:t>
-            </a:r>
-            <a:br/>
-            <a:r>
-              <a:rPr lang="ko" sz="900">
-                <a:latin typeface="맑은 고딕"/>
-                <a:ea typeface="맑은 고딕"/>
-                <a:cs typeface="맑은 고딕"/>
-              </a:rPr>
-              <a:t>01/20</a:t>
-            </a:r>
-            <a:br/>
-            <a:r>
-              <a:rPr lang="ko" sz="900">
-                <a:latin typeface="맑은 고딕"/>
-                <a:ea typeface="맑은 고딕"/>
-                <a:cs typeface="맑은 고딕"/>
-              </a:rPr>
-              <a:t>01/20</a:t>
-            </a:r>
-            <a:br/>
-            <a:r>
-              <a:rPr lang="ko" sz="900">
-                <a:latin typeface="맑은 고딕"/>
-                <a:ea typeface="맑은 고딕"/>
-                <a:cs typeface="맑은 고딕"/>
-              </a:rPr>
-              <a:t>02/05</a:t>
-            </a:r>
-            <a:br/>
-            <a:r>
-              <a:rPr lang="ko" sz="900">
-                <a:latin typeface="맑은 고딕"/>
-                <a:ea typeface="맑은 고딕"/>
-                <a:cs typeface="맑은 고딕"/>
-              </a:rPr>
-              <a:t>01/17</a:t>
-            </a:r>
-            <a:br/>
-            <a:r>
-              <a:rPr lang="ko" sz="900">
-                <a:latin typeface="맑은 고딕"/>
-                <a:ea typeface="맑은 고딕"/>
-                <a:cs typeface="맑은 고딕"/>
-              </a:rPr>
-              <a:t>01/18</a:t>
-            </a:r>
-            <a:br/>
-            <a:r>
-              <a:rPr lang="ko" sz="900">
-                <a:latin typeface="맑은 고딕"/>
-                <a:ea typeface="맑은 고딕"/>
-                <a:cs typeface="맑은 고딕"/>
-              </a:rPr>
               <a:t>01/31</a:t>
             </a:r>
             <a:br/>
@@ -3791,14 +4007,35 @@
                 <a:ea typeface="맑은 고딕"/>
                 <a:cs typeface="맑은 고딕"/>
               </a:rPr>
-              <a:t>01/20</a:t>
-            </a:r>
-          </a:p>
-        </p:txBody>
-      </p:sp>
-      <p:sp>
-        <p:nvSpPr>
-          <p:cNvPr id="977247865" name="Text">
+              <a:t>01/31</a:t>
+            </a:r>
+            <a:br/>
+            <a:br/>
+            <a:r>
+              <a:rPr lang="ko" sz="900">
+                <a:latin typeface="맑은 고딕"/>
+                <a:ea typeface="맑은 고딕"/>
+                <a:cs typeface="맑은 고딕"/>
+              </a:rPr>
+              <a:t>03/31</a:t>
+            </a:r>
+            <a:br/>
+            <a:br/>
+            <a:r>
+              <a:rPr lang="ko" sz="900">
+                <a:latin typeface="맑은 고딕"/>
+                <a:ea typeface="맑은 고딕"/>
+                <a:cs typeface="맑은 고딕"/>
+              </a:rPr>
+              <a:t>02/28</a:t>
+            </a:r>
+            <a:br/>
+          </a:p>
+        </p:txBody>
+      </p:sp>
+      <p:sp>
+        <p:nvSpPr>
+          <p:cNvPr id="1726757205" name="Text">
     </p:cNvPr>
           <p:cNvSpPr>
             <a:spLocks noGrp="1"/>
@@ -3808,7 +4045,7 @@
         <p:spPr>
           <a:xfrm rot="0">
             <a:off x="5041900" y="1689100"/>
-            <a:ext cx="635000" cy="3187700"/>
+            <a:ext cx="635000" cy="1524000"/>
           </a:xfrm>
           <a:prstGeom prst="rect">
             <a:avLst/>
@@ -3844,152 +4081,6 @@
                 <a:ea typeface="맑은 고딕"/>
                 <a:cs typeface="맑은 고딕"/>
               </a:rPr>
-              <a:t>01/16</a:t>
-            </a:r>
-            <a:br/>
-            <a:r>
-              <a:rPr lang="ko" sz="900">
-                <a:latin typeface="맑은 고딕"/>
-                <a:ea typeface="맑은 고딕"/>
-                <a:cs typeface="맑은 고딕"/>
-              </a:rPr>
-              <a:t>01/17</a:t>
-            </a:r>
-            <a:br/>
-            <a:r>
-              <a:rPr lang="ko" sz="900">
-                <a:latin typeface="맑은 고딕"/>
-                <a:ea typeface="맑은 고딕"/>
-                <a:cs typeface="맑은 고딕"/>
-              </a:rPr>
-              <a:t>01/17</a:t>
-            </a:r>
-            <a:br/>
-            <a:r>
-              <a:rPr lang="ko" sz="900">
-                <a:latin typeface="맑은 고딕"/>
-                <a:ea typeface="맑은 고딕"/>
-                <a:cs typeface="맑은 고딕"/>
-              </a:rPr>
-              <a:t>01/18</a:t>
-            </a:r>
-            <a:br/>
-            <a:r>
-              <a:rPr lang="ko" sz="900">
-                <a:latin typeface="맑은 고딕"/>
-                <a:ea typeface="맑은 고딕"/>
-                <a:cs typeface="맑은 고딕"/>
-              </a:rPr>
-              <a:t>01/19</a:t>
-            </a:r>
-            <a:br/>
-            <a:r>
-              <a:rPr lang="ko" sz="900">
-                <a:latin typeface="맑은 고딕"/>
-                <a:ea typeface="맑은 고딕"/>
-                <a:cs typeface="맑은 고딕"/>
-              </a:rPr>
-              <a:t>01/19</a:t>
-            </a:r>
-            <a:br/>
-            <a:r>
-              <a:rPr lang="ko" sz="900">
-                <a:latin typeface="맑은 고딕"/>
-                <a:ea typeface="맑은 고딕"/>
-                <a:cs typeface="맑은 고딕"/>
-              </a:rPr>
-              <a:t>01/19</a:t>
-            </a:r>
-            <a:br/>
-            <a:r>
-              <a:rPr lang="ko" sz="900">
-                <a:latin typeface="맑은 고딕"/>
-                <a:ea typeface="맑은 고딕"/>
-                <a:cs typeface="맑은 고딕"/>
-              </a:rPr>
-              <a:t>01/19</a:t>
-            </a:r>
-            <a:br/>
-            <a:br/>
-            <a:r>
-              <a:rPr lang="ko" sz="900">
-                <a:latin typeface="맑은 고딕"/>
-                <a:ea typeface="맑은 고딕"/>
-                <a:cs typeface="맑은 고딕"/>
-              </a:rPr>
-              <a:t>01/19</a:t>
-            </a:r>
-            <a:br/>
-            <a:br/>
-            <a:r>
-              <a:rPr lang="ko" sz="900">
-                <a:latin typeface="맑은 고딕"/>
-                <a:ea typeface="맑은 고딕"/>
-                <a:cs typeface="맑은 고딕"/>
-              </a:rPr>
-              <a:t>01/19</a:t>
-            </a:r>
-            <a:br/>
-            <a:r>
-              <a:rPr lang="ko" sz="900">
-                <a:latin typeface="맑은 고딕"/>
-                <a:ea typeface="맑은 고딕"/>
-                <a:cs typeface="맑은 고딕"/>
-              </a:rPr>
-              <a:t>01/20</a:t>
-            </a:r>
-            <a:br/>
-            <a:r>
-              <a:rPr lang="ko" sz="900">
-                <a:latin typeface="맑은 고딕"/>
-                <a:ea typeface="맑은 고딕"/>
-                <a:cs typeface="맑은 고딕"/>
-              </a:rPr>
-              <a:t>01/20</a:t>
-            </a:r>
-            <a:br/>
-            <a:r>
-              <a:rPr lang="ko" sz="900">
-                <a:latin typeface="맑은 고딕"/>
-                <a:ea typeface="맑은 고딕"/>
-                <a:cs typeface="맑은 고딕"/>
-              </a:rPr>
-              <a:t>01/20</a:t>
-            </a:r>
-            <a:br/>
-            <a:r>
-              <a:rPr lang="ko" sz="900">
-                <a:latin typeface="맑은 고딕"/>
-                <a:ea typeface="맑은 고딕"/>
-                <a:cs typeface="맑은 고딕"/>
-              </a:rPr>
-              <a:t>20%</a:t>
-            </a:r>
-            <a:br/>
-            <a:r>
-              <a:rPr lang="ko" sz="900">
-                <a:latin typeface="맑은 고딕"/>
-                <a:ea typeface="맑은 고딕"/>
-                <a:cs typeface="맑은 고딕"/>
-              </a:rPr>
-              <a:t>01/17</a:t>
-            </a:r>
-            <a:br/>
-            <a:r>
-              <a:rPr lang="ko" sz="900">
-                <a:latin typeface="맑은 고딕"/>
-                <a:ea typeface="맑은 고딕"/>
-                <a:cs typeface="맑은 고딕"/>
-              </a:rPr>
-              <a:t>01/18</a:t>
-            </a:r>
-            <a:br/>
-            <a:r>
-              <a:rPr lang="ko" sz="900">
-                <a:latin typeface="맑은 고딕"/>
-                <a:ea typeface="맑은 고딕"/>
-                <a:cs typeface="맑은 고딕"/>
-              </a:rPr>
               <a:t>01/31</a:t>
             </a:r>
             <a:br/>
@@ -3999,14 +4090,35 @@
                 <a:ea typeface="맑은 고딕"/>
                 <a:cs typeface="맑은 고딕"/>
               </a:rPr>
-              <a:t>01/20</a:t>
-            </a:r>
-          </a:p>
-        </p:txBody>
-      </p:sp>
-      <p:sp>
-        <p:nvSpPr>
-          <p:cNvPr id="1751385364" name="Text">
+              <a:t>01/31</a:t>
+            </a:r>
+            <a:br/>
+            <a:br/>
+            <a:r>
+              <a:rPr lang="ko" sz="900">
+                <a:latin typeface="맑은 고딕"/>
+                <a:ea typeface="맑은 고딕"/>
+                <a:cs typeface="맑은 고딕"/>
+              </a:rPr>
+              <a:t>50%</a:t>
+            </a:r>
+            <a:br/>
+            <a:br/>
+            <a:r>
+              <a:rPr lang="ko" sz="900">
+                <a:latin typeface="맑은 고딕"/>
+                <a:ea typeface="맑은 고딕"/>
+                <a:cs typeface="맑은 고딕"/>
+              </a:rPr>
+              <a:t>10%</a:t>
+            </a:r>
+            <a:br/>
+          </a:p>
+        </p:txBody>
+      </p:sp>
+      <p:sp>
+        <p:nvSpPr>
+          <p:cNvPr id="1988508379" name="Text">
     </p:cNvPr>
           <p:cNvSpPr>
             <a:spLocks noGrp="1"/>
@@ -4016,7 +4128,7 @@
         <p:spPr>
           <a:xfrm rot="0">
             <a:off x="3771900" y="1689100"/>
-            <a:ext cx="635000" cy="3187700"/>
+            <a:ext cx="635000" cy="1524000"/>
           </a:xfrm>
           <a:prstGeom prst="rect">
             <a:avLst/>
@@ -4052,169 +4164,44 @@
                 <a:ea typeface="맑은 고딕"/>
                 <a:cs typeface="맑은 고딕"/>
               </a:rPr>
-              <a:t>01/16</a:t>
-            </a:r>
-            <a:br/>
-            <a:r>
-              <a:rPr lang="ko" sz="900">
-                <a:latin typeface="맑은 고딕"/>
-                <a:ea typeface="맑은 고딕"/>
-                <a:cs typeface="맑은 고딕"/>
-              </a:rPr>
-              <a:t>01/17</a:t>
-            </a:r>
-            <a:br/>
-            <a:r>
-              <a:rPr lang="ko" sz="900">
-                <a:latin typeface="맑은 고딕"/>
-                <a:ea typeface="맑은 고딕"/>
-                <a:cs typeface="맑은 고딕"/>
-              </a:rPr>
-              <a:t>01/17</a:t>
-            </a:r>
-            <a:br/>
-            <a:r>
-              <a:rPr lang="ko" sz="900">
-                <a:latin typeface="맑은 고딕"/>
-                <a:ea typeface="맑은 고딕"/>
-                <a:cs typeface="맑은 고딕"/>
-              </a:rPr>
-              <a:t>01/18</a:t>
-            </a:r>
-            <a:br/>
-            <a:r>
-              <a:rPr lang="ko" sz="900">
-                <a:latin typeface="맑은 고딕"/>
-                <a:ea typeface="맑은 고딕"/>
-                <a:cs typeface="맑은 고딕"/>
-              </a:rPr>
-              <a:t>01/19</a:t>
-            </a:r>
-            <a:br/>
-            <a:r>
-              <a:rPr lang="ko" sz="900">
-                <a:latin typeface="맑은 고딕"/>
-                <a:ea typeface="맑은 고딕"/>
-                <a:cs typeface="맑은 고딕"/>
-              </a:rPr>
-              <a:t>01/19</a:t>
-            </a:r>
-            <a:br/>
-            <a:r>
-              <a:rPr lang="ko" sz="900">
-                <a:latin typeface="맑은 고딕"/>
-                <a:ea typeface="맑은 고딕"/>
-                <a:cs typeface="맑은 고딕"/>
-              </a:rPr>
-              <a:t>01/19</a:t>
-            </a:r>
-            <a:br/>
-            <a:r>
-              <a:rPr lang="ko" sz="900">
-                <a:latin typeface="맑은 고딕"/>
-                <a:ea typeface="맑은 고딕"/>
-                <a:cs typeface="맑은 고딕"/>
-              </a:rPr>
-              <a:t>01/19</a:t>
-            </a:r>
-            <a:br/>
-            <a:br/>
-            <a:r>
-              <a:rPr lang="ko" sz="900">
-                <a:latin typeface="맑은 고딕"/>
-                <a:ea typeface="맑은 고딕"/>
-                <a:cs typeface="맑은 고딕"/>
-              </a:rPr>
-              <a:t>01/19</a:t>
-            </a:r>
-            <a:br/>
-            <a:br/>
-            <a:r>
-              <a:rPr lang="ko" sz="900">
-                <a:latin typeface="맑은 고딕"/>
-                <a:ea typeface="맑은 고딕"/>
-                <a:cs typeface="맑은 고딕"/>
-              </a:rPr>
-              <a:t>01/19</a:t>
-            </a:r>
-            <a:br/>
-            <a:r>
-              <a:rPr lang="ko" sz="900">
-                <a:latin typeface="맑은 고딕"/>
-                <a:ea typeface="맑은 고딕"/>
-                <a:cs typeface="맑은 고딕"/>
-              </a:rPr>
-              <a:t>01/20</a:t>
-            </a:r>
-            <a:br/>
-            <a:r>
-              <a:rPr lang="ko" sz="900">
-                <a:latin typeface="맑은 고딕"/>
-                <a:ea typeface="맑은 고딕"/>
-                <a:cs typeface="맑은 고딕"/>
-              </a:rPr>
-              <a:t>01/20</a:t>
-            </a:r>
-            <a:br/>
-            <a:r>
-              <a:rPr lang="ko" sz="900">
-                <a:latin typeface="맑은 고딕"/>
-                <a:ea typeface="맑은 고딕"/>
-                <a:cs typeface="맑은 고딕"/>
-              </a:rPr>
-              <a:t>01/20</a:t>
-            </a:r>
-            <a:br/>
-            <a:r>
-              <a:rPr lang="ko" sz="900">
-                <a:latin typeface="맑은 고딕"/>
-                <a:ea typeface="맑은 고딕"/>
-                <a:cs typeface="맑은 고딕"/>
-              </a:rPr>
-              <a:t>01/16</a:t>
-            </a:r>
-            <a:br/>
-            <a:r>
-              <a:rPr lang="ko" sz="900">
-                <a:latin typeface="맑은 고딕"/>
-                <a:ea typeface="맑은 고딕"/>
-                <a:cs typeface="맑은 고딕"/>
-              </a:rPr>
-              <a:t>01/16</a:t>
-            </a:r>
-            <a:br/>
-            <a:r>
-              <a:rPr lang="ko" sz="900">
-                <a:latin typeface="맑은 고딕"/>
-                <a:ea typeface="맑은 고딕"/>
-                <a:cs typeface="맑은 고딕"/>
-              </a:rPr>
-              <a:t>01/17</a:t>
-            </a:r>
-            <a:br/>
-            <a:r>
-              <a:rPr lang="ko" sz="900">
-                <a:latin typeface="맑은 고딕"/>
-                <a:ea typeface="맑은 고딕"/>
-                <a:cs typeface="맑은 고딕"/>
-              </a:rPr>
-              <a:t>01/16</a:t>
-            </a:r>
-            <a:br/>
-            <a:r>
-              <a:rPr lang="ko" sz="900">
-                <a:latin typeface="맑은 고딕"/>
-                <a:ea typeface="맑은 고딕"/>
-                <a:cs typeface="맑은 고딕"/>
-              </a:rPr>
-              <a:t>01/18</a:t>
-            </a:r>
-          </a:p>
-        </p:txBody>
-      </p:sp>
-      <p:sp>
-        <p:nvSpPr>
-          <p:cNvPr id="413635779" name="Text">
+              <a:t>01/02</a:t>
+            </a:r>
+            <a:br/>
+            <a:r>
+              <a:rPr lang="ko" sz="900">
+                <a:latin typeface="맑은 고딕"/>
+                <a:ea typeface="맑은 고딕"/>
+                <a:cs typeface="맑은 고딕"/>
+              </a:rPr>
+              <a:t>01/02</a:t>
+            </a:r>
+            <a:br/>
+            <a:br/>
+            <a:r>
+              <a:rPr lang="ko" sz="900">
+                <a:latin typeface="맑은 고딕"/>
+                <a:ea typeface="맑은 고딕"/>
+                <a:cs typeface="맑은 고딕"/>
+              </a:rPr>
+              <a:t>01/02</a:t>
+            </a:r>
+            <a:br/>
+            <a:br/>
+            <a:r>
+              <a:rPr lang="ko" sz="900">
+                <a:latin typeface="맑은 고딕"/>
+                <a:ea typeface="맑은 고딕"/>
+                <a:cs typeface="맑은 고딕"/>
+              </a:rPr>
+              <a:t>02/01</a:t>
+            </a:r>
+            <a:br/>
+          </a:p>
+        </p:txBody>
+      </p:sp>
+      <p:sp>
+        <p:nvSpPr>
+          <p:cNvPr id="1863590313" name="Text">
     </p:cNvPr>
           <p:cNvSpPr>
             <a:spLocks noGrp="1"/>
@@ -4260,7 +4247,7 @@
       </p:sp>
       <p:pic>
         <p:nvPicPr>
-          <p:cNvPr id="775979505" name="Picture">
+          <p:cNvPr id="407683232" name="Picture">
     </p:cNvPr>
           <p:cNvPicPr>
             <a:picLocks noChangeAspect="1"/>

</xml_diff>